<commit_message>
Added the contents in ppt
</commit_message>
<xml_diff>
--- a/Group No.pptx
+++ b/Group No.pptx
@@ -10,6 +10,10 @@
     <p:sldId id="258" r:id="rId4"/>
     <p:sldId id="259" r:id="rId5"/>
     <p:sldId id="260" r:id="rId6"/>
+    <p:sldId id="261" r:id="rId7"/>
+    <p:sldId id="262" r:id="rId8"/>
+    <p:sldId id="263" r:id="rId9"/>
+    <p:sldId id="264" r:id="rId10"/>
   </p:sldIdLst>
   <p:sldSz cx="12192000" cy="6858000"/>
   <p:notesSz cx="6858000" cy="9144000"/>
@@ -112,6 +116,11 @@
     <p:ext uri="{EFAFB233-063F-42B5-8137-9DF3F51BA10A}">
       <p15:sldGuideLst xmlns:p15="http://schemas.microsoft.com/office/powerpoint/2012/main">
         <p15:guide id="1" orient="horz" pos="1056" userDrawn="1">
+          <p15:clr>
+            <a:srgbClr val="A4A3A4"/>
+          </p15:clr>
+        </p15:guide>
+        <p15:guide id="2" pos="3840">
           <p15:clr>
             <a:srgbClr val="A4A3A4"/>
           </p15:clr>
@@ -7658,27 +7667,48 @@
           <a:lstStyle/>
           <a:p>
             <a:r>
-              <a:rPr lang="en-US" b="1" dirty="0" smtClean="0"/>
+              <a:rPr lang="en-US" b="1" dirty="0" smtClean="0">
+                <a:latin typeface="Arial" panose="020B0604020202020204" pitchFamily="34" charset="0"/>
+                <a:cs typeface="Arial" panose="020B0604020202020204" pitchFamily="34" charset="0"/>
+              </a:rPr>
               <a:t>Group No : 2</a:t>
             </a:r>
             <a:br>
-              <a:rPr lang="en-US" b="1" dirty="0" smtClean="0"/>
+              <a:rPr lang="en-US" b="1" dirty="0" smtClean="0">
+                <a:latin typeface="Arial" panose="020B0604020202020204" pitchFamily="34" charset="0"/>
+                <a:cs typeface="Arial" panose="020B0604020202020204" pitchFamily="34" charset="0"/>
+              </a:rPr>
             </a:br>
             <a:r>
-              <a:rPr lang="en-US" b="1" dirty="0" smtClean="0"/>
+              <a:rPr lang="en-US" b="1" dirty="0" smtClean="0">
+                <a:latin typeface="Arial" panose="020B0604020202020204" pitchFamily="34" charset="0"/>
+                <a:cs typeface="Arial" panose="020B0604020202020204" pitchFamily="34" charset="0"/>
+              </a:rPr>
               <a:t>Section : 1</a:t>
             </a:r>
             <a:br>
-              <a:rPr lang="en-US" b="1" dirty="0" smtClean="0"/>
+              <a:rPr lang="en-US" b="1" dirty="0" smtClean="0">
+                <a:latin typeface="Arial" panose="020B0604020202020204" pitchFamily="34" charset="0"/>
+                <a:cs typeface="Arial" panose="020B0604020202020204" pitchFamily="34" charset="0"/>
+              </a:rPr>
             </a:br>
             <a:r>
-              <a:rPr lang="en-US" b="1" dirty="0"/>
+              <a:rPr lang="en-US" b="1" dirty="0">
+                <a:latin typeface="Arial" panose="020B0604020202020204" pitchFamily="34" charset="0"/>
+                <a:cs typeface="Arial" panose="020B0604020202020204" pitchFamily="34" charset="0"/>
+              </a:rPr>
               <a:t>CSS-FLEXBOX</a:t>
             </a:r>
             <a:br>
-              <a:rPr lang="en-US" b="1" dirty="0"/>
+              <a:rPr lang="en-US" b="1" dirty="0">
+                <a:latin typeface="Arial" panose="020B0604020202020204" pitchFamily="34" charset="0"/>
+                <a:cs typeface="Arial" panose="020B0604020202020204" pitchFamily="34" charset="0"/>
+              </a:rPr>
             </a:br>
-            <a:endParaRPr lang="en-US" dirty="0"/>
+            <a:endParaRPr lang="en-US" dirty="0">
+              <a:latin typeface="Arial" panose="020B0604020202020204" pitchFamily="34" charset="0"/>
+              <a:cs typeface="Arial" panose="020B0604020202020204" pitchFamily="34" charset="0"/>
+            </a:endParaRPr>
           </a:p>
         </p:txBody>
       </p:sp>
@@ -7840,22 +7870,37 @@
           <a:lstStyle/>
           <a:p>
             <a:r>
-              <a:rPr lang="en-US" b="1" dirty="0" smtClean="0"/>
+              <a:rPr lang="en-US" b="1" dirty="0" smtClean="0">
+                <a:latin typeface="Arial" panose="020B0604020202020204" pitchFamily="34" charset="0"/>
+                <a:cs typeface="Arial" panose="020B0604020202020204" pitchFamily="34" charset="0"/>
+              </a:rPr>
               <a:t>Team</a:t>
             </a:r>
             <a:r>
-              <a:rPr lang="en-US" dirty="0" smtClean="0"/>
+              <a:rPr lang="en-US" dirty="0" smtClean="0">
+                <a:latin typeface="Arial" panose="020B0604020202020204" pitchFamily="34" charset="0"/>
+                <a:cs typeface="Arial" panose="020B0604020202020204" pitchFamily="34" charset="0"/>
+              </a:rPr>
               <a:t> </a:t>
             </a:r>
             <a:r>
-              <a:rPr lang="en-US" b="1" dirty="0" smtClean="0"/>
+              <a:rPr lang="en-US" b="1" dirty="0" smtClean="0">
+                <a:latin typeface="Arial" panose="020B0604020202020204" pitchFamily="34" charset="0"/>
+                <a:cs typeface="Arial" panose="020B0604020202020204" pitchFamily="34" charset="0"/>
+              </a:rPr>
               <a:t>Members</a:t>
             </a:r>
             <a:r>
-              <a:rPr lang="en-US" dirty="0" smtClean="0"/>
+              <a:rPr lang="en-US" dirty="0" smtClean="0">
+                <a:latin typeface="Arial" panose="020B0604020202020204" pitchFamily="34" charset="0"/>
+                <a:cs typeface="Arial" panose="020B0604020202020204" pitchFamily="34" charset="0"/>
+              </a:rPr>
               <a:t>: </a:t>
             </a:r>
-            <a:endParaRPr lang="en-US" dirty="0"/>
+            <a:endParaRPr lang="en-US" dirty="0">
+              <a:latin typeface="Arial" panose="020B0604020202020204" pitchFamily="34" charset="0"/>
+              <a:cs typeface="Arial" panose="020B0604020202020204" pitchFamily="34" charset="0"/>
+            </a:endParaRPr>
           </a:p>
         </p:txBody>
       </p:sp>
@@ -7883,8 +7928,8 @@
         </p:blipFill>
         <p:spPr>
           <a:xfrm>
-            <a:off x="4271555" y="2916474"/>
-            <a:ext cx="1606731" cy="2104188"/>
+            <a:off x="4159837" y="2939829"/>
+            <a:ext cx="1606731" cy="1953962"/>
           </a:xfrm>
         </p:spPr>
       </p:pic>
@@ -7896,8 +7941,8 @@
         </p:nvSpPr>
         <p:spPr>
           <a:xfrm>
-            <a:off x="3958046" y="5421086"/>
-            <a:ext cx="2325189" cy="369332"/>
+            <a:off x="3684936" y="4924195"/>
+            <a:ext cx="2712042" cy="338554"/>
           </a:xfrm>
           <a:prstGeom prst="rect">
             <a:avLst/>
@@ -7911,18 +7956,19 @@
           <a:lstStyle/>
           <a:p>
             <a:r>
-              <a:rPr lang="en-US" sz="1200" dirty="0" smtClean="0"/>
-              <a:t>Mahender Reddy</a:t>
-            </a:r>
-            <a:r>
-              <a:rPr lang="en-US" dirty="0" smtClean="0"/>
-              <a:t> </a:t>
-            </a:r>
-            <a:r>
-              <a:rPr lang="en-US" sz="1200" dirty="0"/>
+              <a:rPr lang="en-US" sz="1600" b="1" dirty="0" smtClean="0">
+                <a:latin typeface="Arial" panose="020B0604020202020204" pitchFamily="34" charset="0"/>
+                <a:cs typeface="Arial" panose="020B0604020202020204" pitchFamily="34" charset="0"/>
+              </a:rPr>
+              <a:t>Mahender Reddy </a:t>
+            </a:r>
+            <a:r>
+              <a:rPr lang="en-US" sz="1600" b="1" dirty="0">
+                <a:latin typeface="Arial" panose="020B0604020202020204" pitchFamily="34" charset="0"/>
+                <a:cs typeface="Arial" panose="020B0604020202020204" pitchFamily="34" charset="0"/>
+              </a:rPr>
               <a:t>Surkanti</a:t>
             </a:r>
-            <a:endParaRPr lang="en-US" sz="1200" dirty="0"/>
           </a:p>
         </p:txBody>
       </p:sp>
@@ -7934,8 +7980,8 @@
         </p:nvSpPr>
         <p:spPr>
           <a:xfrm>
-            <a:off x="1881052" y="5434149"/>
-            <a:ext cx="1802674" cy="369332"/>
+            <a:off x="1863319" y="4934604"/>
+            <a:ext cx="1802674" cy="338554"/>
           </a:xfrm>
           <a:prstGeom prst="rect">
             <a:avLst/>
@@ -7949,18 +7995,23 @@
           <a:lstStyle/>
           <a:p>
             <a:r>
-              <a:rPr lang="en-US" sz="1200" dirty="0"/>
-              <a:t>Akhitha</a:t>
-            </a:r>
-            <a:r>
-              <a:rPr lang="en-US" dirty="0"/>
-              <a:t> </a:t>
-            </a:r>
-            <a:r>
-              <a:rPr lang="en-US" sz="1200" dirty="0" smtClean="0"/>
+              <a:rPr lang="en-US" sz="1600" b="1" dirty="0">
+                <a:latin typeface="Arial" panose="020B0604020202020204" pitchFamily="34" charset="0"/>
+                <a:cs typeface="Arial" panose="020B0604020202020204" pitchFamily="34" charset="0"/>
+              </a:rPr>
+              <a:t>Akhitha </a:t>
+            </a:r>
+            <a:r>
+              <a:rPr lang="en-US" sz="1600" b="1" dirty="0" smtClean="0">
+                <a:latin typeface="Arial" panose="020B0604020202020204" pitchFamily="34" charset="0"/>
+                <a:cs typeface="Arial" panose="020B0604020202020204" pitchFamily="34" charset="0"/>
+              </a:rPr>
               <a:t>Tumula</a:t>
             </a:r>
-            <a:endParaRPr lang="en-US" sz="1200" dirty="0"/>
+            <a:endParaRPr lang="en-US" sz="1600" b="1" dirty="0">
+              <a:latin typeface="Arial" panose="020B0604020202020204" pitchFamily="34" charset="0"/>
+              <a:cs typeface="Arial" panose="020B0604020202020204" pitchFamily="34" charset="0"/>
+            </a:endParaRPr>
           </a:p>
         </p:txBody>
       </p:sp>
@@ -7972,8 +8023,8 @@
         </p:nvSpPr>
         <p:spPr>
           <a:xfrm>
-            <a:off x="6335487" y="5473337"/>
-            <a:ext cx="2103119" cy="276999"/>
+            <a:off x="6415921" y="4888437"/>
+            <a:ext cx="2461378" cy="338554"/>
           </a:xfrm>
           <a:prstGeom prst="rect">
             <a:avLst/>
@@ -7987,10 +8038,23 @@
           <a:lstStyle/>
           <a:p>
             <a:r>
-              <a:rPr lang="en-US" sz="1200" dirty="0" smtClean="0"/>
-              <a:t>Rethima Reddy Polam</a:t>
-            </a:r>
-            <a:endParaRPr lang="en-US" sz="1200" dirty="0"/>
+              <a:rPr lang="en-US" sz="1600" b="1" dirty="0" smtClean="0">
+                <a:latin typeface="Arial" panose="020B0604020202020204" pitchFamily="34" charset="0"/>
+                <a:cs typeface="Arial" panose="020B0604020202020204" pitchFamily="34" charset="0"/>
+              </a:rPr>
+              <a:t>RethimaReddy </a:t>
+            </a:r>
+            <a:r>
+              <a:rPr lang="en-US" sz="1600" b="1" dirty="0" smtClean="0">
+                <a:latin typeface="Arial" panose="020B0604020202020204" pitchFamily="34" charset="0"/>
+                <a:cs typeface="Arial" panose="020B0604020202020204" pitchFamily="34" charset="0"/>
+              </a:rPr>
+              <a:t>Polam</a:t>
+            </a:r>
+            <a:endParaRPr lang="en-US" sz="1600" b="1" dirty="0">
+              <a:latin typeface="Arial" panose="020B0604020202020204" pitchFamily="34" charset="0"/>
+              <a:cs typeface="Arial" panose="020B0604020202020204" pitchFamily="34" charset="0"/>
+            </a:endParaRPr>
           </a:p>
         </p:txBody>
       </p:sp>
@@ -8002,8 +8066,8 @@
         </p:nvSpPr>
         <p:spPr>
           <a:xfrm>
-            <a:off x="8778241" y="5447211"/>
-            <a:ext cx="2103120" cy="276999"/>
+            <a:off x="8785898" y="4885032"/>
+            <a:ext cx="2453601" cy="338554"/>
           </a:xfrm>
           <a:prstGeom prst="rect">
             <a:avLst/>
@@ -8017,13 +8081,45 @@
           <a:lstStyle/>
           <a:p>
             <a:r>
-              <a:rPr lang="en-US" sz="1200" dirty="0"/>
+              <a:rPr lang="en-US" sz="1600" b="1" dirty="0">
+                <a:latin typeface="Arial" panose="020B0604020202020204" pitchFamily="34" charset="0"/>
+                <a:cs typeface="Arial" panose="020B0604020202020204" pitchFamily="34" charset="0"/>
+              </a:rPr>
               <a:t>Rohan Goud Bhandari</a:t>
             </a:r>
-            <a:endParaRPr lang="en-US" sz="1200" dirty="0"/>
-          </a:p>
-        </p:txBody>
-      </p:sp>
+          </a:p>
+        </p:txBody>
+      </p:sp>
+      <p:pic>
+        <p:nvPicPr>
+          <p:cNvPr id="3" name="Picture 2"/>
+          <p:cNvPicPr>
+            <a:picLocks noChangeAspect="1"/>
+          </p:cNvPicPr>
+          <p:nvPr/>
+        </p:nvPicPr>
+        <p:blipFill>
+          <a:blip r:embed="rId3">
+            <a:extLst>
+              <a:ext uri="{28A0092B-C50C-407E-A947-70E740481C1C}">
+                <a14:useLocalDpi xmlns:a14="http://schemas.microsoft.com/office/drawing/2010/main" val="0"/>
+              </a:ext>
+            </a:extLst>
+          </a:blip>
+          <a:stretch>
+            <a:fillRect/>
+          </a:stretch>
+        </p:blipFill>
+        <p:spPr>
+          <a:xfrm>
+            <a:off x="6723945" y="2953560"/>
+            <a:ext cx="1511960" cy="1931472"/>
+          </a:xfrm>
+          <a:prstGeom prst="rect">
+            <a:avLst/>
+          </a:prstGeom>
+        </p:spPr>
+      </p:pic>
     </p:spTree>
     <p:extLst>
       <p:ext uri="{BB962C8B-B14F-4D97-AF65-F5344CB8AC3E}">
@@ -8064,16 +8160,41 @@
             <p:ph type="title"/>
           </p:nvPr>
         </p:nvSpPr>
-        <p:spPr/>
+        <p:spPr>
+          <a:xfrm>
+            <a:off x="4409369" y="846532"/>
+            <a:ext cx="4798132" cy="1280890"/>
+          </a:xfrm>
+        </p:spPr>
         <p:txBody>
           <a:bodyPr/>
           <a:lstStyle/>
           <a:p>
             <a:r>
-              <a:rPr lang="en-US" b="1" dirty="0" smtClean="0"/>
-              <a:t>INTRODUCTION :</a:t>
-            </a:r>
-            <a:endParaRPr lang="en-US" b="1" dirty="0"/>
+              <a:rPr lang="en-US" b="1" dirty="0" smtClean="0">
+                <a:latin typeface="Arial" panose="020B0604020202020204" pitchFamily="34" charset="0"/>
+                <a:cs typeface="Arial" panose="020B0604020202020204" pitchFamily="34" charset="0"/>
+              </a:rPr>
+              <a:t>Agenda</a:t>
+            </a:r>
+            <a:r>
+              <a:rPr lang="en-US" b="1" dirty="0" smtClean="0">
+                <a:latin typeface="Arial" panose="020B0604020202020204" pitchFamily="34" charset="0"/>
+                <a:cs typeface="Arial" panose="020B0604020202020204" pitchFamily="34" charset="0"/>
+              </a:rPr>
+              <a:t> </a:t>
+            </a:r>
+            <a:r>
+              <a:rPr lang="en-US" b="1" dirty="0" smtClean="0">
+                <a:latin typeface="Arial" panose="020B0604020202020204" pitchFamily="34" charset="0"/>
+                <a:cs typeface="Arial" panose="020B0604020202020204" pitchFamily="34" charset="0"/>
+              </a:rPr>
+              <a:t>:</a:t>
+            </a:r>
+            <a:endParaRPr lang="en-US" b="1" dirty="0">
+              <a:latin typeface="Arial" panose="020B0604020202020204" pitchFamily="34" charset="0"/>
+              <a:cs typeface="Arial" panose="020B0604020202020204" pitchFamily="34" charset="0"/>
+            </a:endParaRPr>
           </a:p>
         </p:txBody>
       </p:sp>
@@ -8087,36 +8208,82 @@
             <p:ph idx="1"/>
           </p:nvPr>
         </p:nvSpPr>
-        <p:spPr/>
+        <p:spPr>
+          <a:xfrm>
+            <a:off x="2681415" y="1791729"/>
+            <a:ext cx="8613131" cy="4559643"/>
+          </a:xfrm>
+        </p:spPr>
         <p:txBody>
           <a:bodyPr/>
           <a:lstStyle/>
           <a:p>
             <a:r>
-              <a:rPr lang="en-US" dirty="0" smtClean="0"/>
-              <a:t>Mahender</a:t>
-            </a:r>
-          </a:p>
-          <a:p>
-            <a:r>
-              <a:rPr lang="en-US" dirty="0" smtClean="0"/>
-              <a:t>Rethima</a:t>
-            </a:r>
-          </a:p>
-          <a:p>
-            <a:r>
-              <a:rPr lang="en-US" dirty="0" smtClean="0"/>
-              <a:t>Akhitha</a:t>
-            </a:r>
-          </a:p>
-          <a:p>
-            <a:r>
-              <a:rPr lang="en-US" dirty="0" smtClean="0"/>
-              <a:t>Rohan</a:t>
-            </a:r>
-          </a:p>
-          <a:p>
-            <a:endParaRPr lang="en-US" dirty="0" smtClean="0"/>
+              <a:rPr lang="en-US" dirty="0" smtClean="0">
+                <a:latin typeface="Arial" panose="020B0604020202020204" pitchFamily="34" charset="0"/>
+                <a:cs typeface="Arial" panose="020B0604020202020204" pitchFamily="34" charset="0"/>
+              </a:rPr>
+              <a:t>What is CSS Grid and CSS FlexBox</a:t>
+            </a:r>
+            <a:endParaRPr lang="en-US" dirty="0" smtClean="0">
+              <a:latin typeface="Arial" panose="020B0604020202020204" pitchFamily="34" charset="0"/>
+              <a:cs typeface="Arial" panose="020B0604020202020204" pitchFamily="34" charset="0"/>
+            </a:endParaRPr>
+          </a:p>
+          <a:p>
+            <a:r>
+              <a:rPr lang="en-US" dirty="0" smtClean="0">
+                <a:latin typeface="Arial" panose="020B0604020202020204" pitchFamily="34" charset="0"/>
+                <a:cs typeface="Arial" panose="020B0604020202020204" pitchFamily="34" charset="0"/>
+              </a:rPr>
+              <a:t>FlexBox</a:t>
+            </a:r>
+          </a:p>
+          <a:p>
+            <a:r>
+              <a:rPr lang="en-US" dirty="0" smtClean="0">
+                <a:latin typeface="Arial" panose="020B0604020202020204" pitchFamily="34" charset="0"/>
+                <a:cs typeface="Arial" panose="020B0604020202020204" pitchFamily="34" charset="0"/>
+              </a:rPr>
+              <a:t>FlexBox Properties</a:t>
+            </a:r>
+          </a:p>
+          <a:p>
+            <a:r>
+              <a:rPr lang="en-US" dirty="0" smtClean="0">
+                <a:latin typeface="Arial" panose="020B0604020202020204" pitchFamily="34" charset="0"/>
+                <a:cs typeface="Arial" panose="020B0604020202020204" pitchFamily="34" charset="0"/>
+              </a:rPr>
+              <a:t>Grid</a:t>
+            </a:r>
+          </a:p>
+          <a:p>
+            <a:r>
+              <a:rPr lang="en-US" dirty="0" smtClean="0">
+                <a:latin typeface="Arial" panose="020B0604020202020204" pitchFamily="34" charset="0"/>
+                <a:cs typeface="Arial" panose="020B0604020202020204" pitchFamily="34" charset="0"/>
+              </a:rPr>
+              <a:t>Grid Properties</a:t>
+            </a:r>
+          </a:p>
+          <a:p>
+            <a:r>
+              <a:rPr lang="en-US" dirty="0" smtClean="0">
+                <a:latin typeface="Arial" panose="020B0604020202020204" pitchFamily="34" charset="0"/>
+                <a:cs typeface="Arial" panose="020B0604020202020204" pitchFamily="34" charset="0"/>
+              </a:rPr>
+              <a:t>Demo</a:t>
+            </a:r>
+            <a:endParaRPr lang="en-US" dirty="0" smtClean="0">
+              <a:latin typeface="Arial" panose="020B0604020202020204" pitchFamily="34" charset="0"/>
+              <a:cs typeface="Arial" panose="020B0604020202020204" pitchFamily="34" charset="0"/>
+            </a:endParaRPr>
+          </a:p>
+          <a:p>
+            <a:endParaRPr lang="en-US" dirty="0" smtClean="0">
+              <a:latin typeface="Arial" panose="020B0604020202020204" pitchFamily="34" charset="0"/>
+              <a:cs typeface="Arial" panose="020B0604020202020204" pitchFamily="34" charset="0"/>
+            </a:endParaRPr>
           </a:p>
         </p:txBody>
       </p:sp>
@@ -8160,28 +8327,34 @@
             <p:ph type="title"/>
           </p:nvPr>
         </p:nvSpPr>
-        <p:spPr/>
+        <p:spPr>
+          <a:xfrm>
+            <a:off x="1866901" y="624110"/>
+            <a:ext cx="9637712" cy="1280890"/>
+          </a:xfrm>
+        </p:spPr>
         <p:txBody>
           <a:bodyPr/>
           <a:lstStyle/>
           <a:p>
             <a:r>
-              <a:rPr lang="en-US" b="1" dirty="0"/>
-              <a:t>ORGANIZATION</a:t>
-            </a:r>
-            <a:r>
-              <a:rPr lang="en-US" dirty="0"/>
-              <a:t> </a:t>
-            </a:r>
-            <a:r>
-              <a:rPr lang="en-US" b="1" dirty="0" smtClean="0"/>
-              <a:t>PROFILE</a:t>
-            </a:r>
-            <a:r>
-              <a:rPr lang="en-US" dirty="0" smtClean="0"/>
-              <a:t> :</a:t>
-            </a:r>
-            <a:endParaRPr lang="en-US" dirty="0"/>
+              <a:rPr lang="en-US" b="1" dirty="0" smtClean="0">
+                <a:latin typeface="Arial" panose="020B0604020202020204" pitchFamily="34" charset="0"/>
+                <a:cs typeface="Arial" panose="020B0604020202020204" pitchFamily="34" charset="0"/>
+              </a:rPr>
+              <a:t>WHAT IS CSS GRID and FLEXBOX</a:t>
+            </a:r>
+            <a:r>
+              <a:rPr lang="en-US" dirty="0" smtClean="0">
+                <a:latin typeface="Arial" panose="020B0604020202020204" pitchFamily="34" charset="0"/>
+                <a:cs typeface="Arial" panose="020B0604020202020204" pitchFamily="34" charset="0"/>
+              </a:rPr>
+              <a:t>:</a:t>
+            </a:r>
+            <a:endParaRPr lang="en-US" dirty="0">
+              <a:latin typeface="Arial" panose="020B0604020202020204" pitchFamily="34" charset="0"/>
+              <a:cs typeface="Arial" panose="020B0604020202020204" pitchFamily="34" charset="0"/>
+            </a:endParaRPr>
           </a:p>
         </p:txBody>
       </p:sp>
@@ -8195,12 +8368,146 @@
             <p:ph idx="1"/>
           </p:nvPr>
         </p:nvSpPr>
-        <p:spPr/>
-        <p:txBody>
-          <a:bodyPr/>
+        <p:spPr>
+          <a:xfrm>
+            <a:off x="1866901" y="1397000"/>
+            <a:ext cx="9637711" cy="4514222"/>
+          </a:xfrm>
+        </p:spPr>
+        <p:txBody>
+          <a:bodyPr>
+            <a:normAutofit/>
+          </a:bodyPr>
           <a:lstStyle/>
           <a:p>
-            <a:endParaRPr lang="en-US" dirty="0"/>
+            <a:r>
+              <a:rPr lang="en-US" sz="2000" dirty="0">
+                <a:latin typeface="Arial" panose="020B0604020202020204" pitchFamily="34" charset="0"/>
+                <a:cs typeface="Arial" panose="020B0604020202020204" pitchFamily="34" charset="0"/>
+              </a:rPr>
+              <a:t>Most web pages are written in a combination of </a:t>
+            </a:r>
+            <a:r>
+              <a:rPr lang="en-US" sz="2000" dirty="0" smtClean="0">
+                <a:latin typeface="Arial" panose="020B0604020202020204" pitchFamily="34" charset="0"/>
+                <a:cs typeface="Arial" panose="020B0604020202020204" pitchFamily="34" charset="0"/>
+              </a:rPr>
+              <a:t>HTML and CSS.</a:t>
+            </a:r>
+          </a:p>
+          <a:p>
+            <a:r>
+              <a:rPr lang="en-US" sz="2000" dirty="0" smtClean="0">
+                <a:latin typeface="Arial" panose="020B0604020202020204" pitchFamily="34" charset="0"/>
+                <a:cs typeface="Arial" panose="020B0604020202020204" pitchFamily="34" charset="0"/>
+              </a:rPr>
+              <a:t>CSS </a:t>
+            </a:r>
+            <a:r>
+              <a:rPr lang="en-US" sz="2000" dirty="0">
+                <a:latin typeface="Arial" panose="020B0604020202020204" pitchFamily="34" charset="0"/>
+                <a:cs typeface="Arial" panose="020B0604020202020204" pitchFamily="34" charset="0"/>
+              </a:rPr>
+              <a:t>specifies how </a:t>
+            </a:r>
+            <a:r>
+              <a:rPr lang="en-US" sz="2000" dirty="0" smtClean="0">
+                <a:latin typeface="Arial" panose="020B0604020202020204" pitchFamily="34" charset="0"/>
+                <a:cs typeface="Arial" panose="020B0604020202020204" pitchFamily="34" charset="0"/>
+              </a:rPr>
+              <a:t>a web page looks </a:t>
+            </a:r>
+            <a:r>
+              <a:rPr lang="en-US" sz="2000" dirty="0">
+                <a:latin typeface="Arial" panose="020B0604020202020204" pitchFamily="34" charset="0"/>
+                <a:cs typeface="Arial" panose="020B0604020202020204" pitchFamily="34" charset="0"/>
+              </a:rPr>
+              <a:t>its colors, fonts, formatting, layout, and styling</a:t>
+            </a:r>
+            <a:r>
+              <a:rPr lang="en-US" sz="2000" dirty="0" smtClean="0">
+                <a:latin typeface="Arial" panose="020B0604020202020204" pitchFamily="34" charset="0"/>
+                <a:cs typeface="Arial" panose="020B0604020202020204" pitchFamily="34" charset="0"/>
+              </a:rPr>
+              <a:t>.</a:t>
+            </a:r>
+          </a:p>
+          <a:p>
+            <a:r>
+              <a:rPr lang="en-US" sz="2000" dirty="0">
+                <a:latin typeface="Arial" panose="020B0604020202020204" pitchFamily="34" charset="0"/>
+                <a:cs typeface="Arial" panose="020B0604020202020204" pitchFamily="34" charset="0"/>
+              </a:rPr>
+              <a:t>CSS </a:t>
+            </a:r>
+            <a:r>
+              <a:rPr lang="en-US" sz="2000" dirty="0" smtClean="0">
+                <a:latin typeface="Arial" panose="020B0604020202020204" pitchFamily="34" charset="0"/>
+                <a:cs typeface="Arial" panose="020B0604020202020204" pitchFamily="34" charset="0"/>
+              </a:rPr>
+              <a:t>flex-box and Grid layout are </a:t>
+            </a:r>
+            <a:r>
+              <a:rPr lang="en-US" sz="2000" dirty="0">
+                <a:latin typeface="Arial" panose="020B0604020202020204" pitchFamily="34" charset="0"/>
+                <a:cs typeface="Arial" panose="020B0604020202020204" pitchFamily="34" charset="0"/>
+              </a:rPr>
+              <a:t>particular </a:t>
+            </a:r>
+            <a:r>
+              <a:rPr lang="en-US" sz="2000" dirty="0" smtClean="0">
+                <a:latin typeface="Arial" panose="020B0604020202020204" pitchFamily="34" charset="0"/>
+                <a:cs typeface="Arial" panose="020B0604020202020204" pitchFamily="34" charset="0"/>
+              </a:rPr>
+              <a:t>ways </a:t>
+            </a:r>
+            <a:r>
+              <a:rPr lang="en-US" sz="2000" dirty="0">
+                <a:latin typeface="Arial" panose="020B0604020202020204" pitchFamily="34" charset="0"/>
+                <a:cs typeface="Arial" panose="020B0604020202020204" pitchFamily="34" charset="0"/>
+              </a:rPr>
+              <a:t>to specify the layout of HTML pages</a:t>
+            </a:r>
+            <a:r>
+              <a:rPr lang="en-US" sz="2000" dirty="0" smtClean="0">
+                <a:latin typeface="Arial" panose="020B0604020202020204" pitchFamily="34" charset="0"/>
+                <a:cs typeface="Arial" panose="020B0604020202020204" pitchFamily="34" charset="0"/>
+              </a:rPr>
+              <a:t>.</a:t>
+            </a:r>
+          </a:p>
+          <a:p>
+            <a:r>
+              <a:rPr lang="en-US" sz="2000" dirty="0">
+                <a:latin typeface="Arial" panose="020B0604020202020204" pitchFamily="34" charset="0"/>
+                <a:cs typeface="Arial" panose="020B0604020202020204" pitchFamily="34" charset="0"/>
+              </a:rPr>
+              <a:t> Flex boxes can adjust in size either decreasing, to avoid unnecessarily monopolizing space, or increasing to make room for contents </a:t>
+            </a:r>
+            <a:r>
+              <a:rPr lang="en-US" sz="2000" dirty="0" smtClean="0">
+                <a:latin typeface="Arial" panose="020B0604020202020204" pitchFamily="34" charset="0"/>
+                <a:cs typeface="Arial" panose="020B0604020202020204" pitchFamily="34" charset="0"/>
+              </a:rPr>
+              <a:t>to </a:t>
+            </a:r>
+            <a:r>
+              <a:rPr lang="en-US" sz="2000" dirty="0">
+                <a:latin typeface="Arial" panose="020B0604020202020204" pitchFamily="34" charset="0"/>
+                <a:cs typeface="Arial" panose="020B0604020202020204" pitchFamily="34" charset="0"/>
+              </a:rPr>
+              <a:t>be constrained within its boundaries.</a:t>
+            </a:r>
+            <a:endParaRPr lang="en-US" sz="2000" dirty="0" smtClean="0">
+              <a:latin typeface="Arial" panose="020B0604020202020204" pitchFamily="34" charset="0"/>
+              <a:cs typeface="Arial" panose="020B0604020202020204" pitchFamily="34" charset="0"/>
+            </a:endParaRPr>
+          </a:p>
+          <a:p>
+            <a:endParaRPr lang="en-US" sz="2000" dirty="0">
+              <a:latin typeface="Arial" panose="020B0604020202020204" pitchFamily="34" charset="0"/>
+              <a:cs typeface="Arial" panose="020B0604020202020204" pitchFamily="34" charset="0"/>
+            </a:endParaRPr>
           </a:p>
         </p:txBody>
       </p:sp>
@@ -8244,12 +8551,27 @@
             <p:ph type="title"/>
           </p:nvPr>
         </p:nvSpPr>
-        <p:spPr/>
+        <p:spPr>
+          <a:xfrm>
+            <a:off x="2592925" y="344710"/>
+            <a:ext cx="8911687" cy="747490"/>
+          </a:xfrm>
+        </p:spPr>
         <p:txBody>
           <a:bodyPr/>
           <a:lstStyle/>
           <a:p>
-            <a:endParaRPr lang="en-US"/>
+            <a:r>
+              <a:rPr lang="en-US" dirty="0" smtClean="0">
+                <a:latin typeface="Arial" panose="020B0604020202020204" pitchFamily="34" charset="0"/>
+                <a:cs typeface="Arial" panose="020B0604020202020204" pitchFamily="34" charset="0"/>
+              </a:rPr>
+              <a:t>Terminology of FlexBox</a:t>
+            </a:r>
+            <a:endParaRPr lang="en-US" dirty="0">
+              <a:latin typeface="Arial" panose="020B0604020202020204" pitchFamily="34" charset="0"/>
+              <a:cs typeface="Arial" panose="020B0604020202020204" pitchFamily="34" charset="0"/>
+            </a:endParaRPr>
           </a:p>
         </p:txBody>
       </p:sp>
@@ -8263,12 +8585,131 @@
             <p:ph idx="1"/>
           </p:nvPr>
         </p:nvSpPr>
-        <p:spPr/>
-        <p:txBody>
-          <a:bodyPr/>
+        <p:spPr>
+          <a:xfrm>
+            <a:off x="1968500" y="1092200"/>
+            <a:ext cx="9536112" cy="5461000"/>
+          </a:xfrm>
+        </p:spPr>
+        <p:txBody>
+          <a:bodyPr>
+            <a:noAutofit/>
+          </a:bodyPr>
           <a:lstStyle/>
           <a:p>
-            <a:endParaRPr lang="en-US"/>
+            <a:pPr marL="0" indent="0">
+              <a:buNone/>
+            </a:pPr>
+            <a:r>
+              <a:rPr lang="en-US" sz="2000" dirty="0">
+                <a:latin typeface="Arial" panose="020B0604020202020204" pitchFamily="34" charset="0"/>
+                <a:cs typeface="Arial" panose="020B0604020202020204" pitchFamily="34" charset="0"/>
+              </a:rPr>
+              <a:t>The flex container properties are:</a:t>
+            </a:r>
+          </a:p>
+          <a:p>
+            <a:r>
+              <a:rPr lang="en-US" sz="2000" dirty="0">
+                <a:latin typeface="Arial" panose="020B0604020202020204" pitchFamily="34" charset="0"/>
+                <a:cs typeface="Arial" panose="020B0604020202020204" pitchFamily="34" charset="0"/>
+              </a:rPr>
+              <a:t>1. flex-directions</a:t>
+            </a:r>
+          </a:p>
+          <a:p>
+            <a:r>
+              <a:rPr lang="en-US" sz="2000" dirty="0">
+                <a:latin typeface="Arial" panose="020B0604020202020204" pitchFamily="34" charset="0"/>
+                <a:cs typeface="Arial" panose="020B0604020202020204" pitchFamily="34" charset="0"/>
+              </a:rPr>
+              <a:t>2. flex-wrap</a:t>
+            </a:r>
+          </a:p>
+          <a:p>
+            <a:r>
+              <a:rPr lang="en-US" sz="2000" dirty="0">
+                <a:latin typeface="Arial" panose="020B0604020202020204" pitchFamily="34" charset="0"/>
+                <a:cs typeface="Arial" panose="020B0604020202020204" pitchFamily="34" charset="0"/>
+              </a:rPr>
+              <a:t>3. justify contents</a:t>
+            </a:r>
+          </a:p>
+          <a:p>
+            <a:r>
+              <a:rPr lang="en-US" sz="2000" dirty="0">
+                <a:latin typeface="Arial" panose="020B0604020202020204" pitchFamily="34" charset="0"/>
+                <a:cs typeface="Arial" panose="020B0604020202020204" pitchFamily="34" charset="0"/>
+              </a:rPr>
+              <a:t>4. align-items</a:t>
+            </a:r>
+          </a:p>
+          <a:p>
+            <a:r>
+              <a:rPr lang="en-US" sz="2000" dirty="0">
+                <a:latin typeface="Arial" panose="020B0604020202020204" pitchFamily="34" charset="0"/>
+                <a:cs typeface="Arial" panose="020B0604020202020204" pitchFamily="34" charset="0"/>
+              </a:rPr>
+              <a:t>5. align-contents</a:t>
+            </a:r>
+          </a:p>
+          <a:p>
+            <a:r>
+              <a:rPr lang="en-US" sz="2000" dirty="0">
+                <a:latin typeface="Arial" panose="020B0604020202020204" pitchFamily="34" charset="0"/>
+                <a:cs typeface="Arial" panose="020B0604020202020204" pitchFamily="34" charset="0"/>
+              </a:rPr>
+              <a:t>6. flex</a:t>
+            </a:r>
+          </a:p>
+          <a:p>
+            <a:r>
+              <a:rPr lang="en-US" sz="2000" dirty="0">
+                <a:latin typeface="Arial" panose="020B0604020202020204" pitchFamily="34" charset="0"/>
+                <a:cs typeface="Arial" panose="020B0604020202020204" pitchFamily="34" charset="0"/>
+              </a:rPr>
+              <a:t>7. order</a:t>
+            </a:r>
+          </a:p>
+          <a:p>
+            <a:r>
+              <a:rPr lang="en-US" sz="2000" dirty="0">
+                <a:latin typeface="Arial" panose="020B0604020202020204" pitchFamily="34" charset="0"/>
+                <a:cs typeface="Arial" panose="020B0604020202020204" pitchFamily="34" charset="0"/>
+              </a:rPr>
+              <a:t>8. flex-grow</a:t>
+            </a:r>
+          </a:p>
+          <a:p>
+            <a:r>
+              <a:rPr lang="en-US" sz="2000" dirty="0">
+                <a:latin typeface="Arial" panose="020B0604020202020204" pitchFamily="34" charset="0"/>
+                <a:cs typeface="Arial" panose="020B0604020202020204" pitchFamily="34" charset="0"/>
+              </a:rPr>
+              <a:t>9. flex-shrink</a:t>
+            </a:r>
+          </a:p>
+          <a:p>
+            <a:r>
+              <a:rPr lang="en-US" sz="2000" dirty="0">
+                <a:latin typeface="Arial" panose="020B0604020202020204" pitchFamily="34" charset="0"/>
+                <a:cs typeface="Arial" panose="020B0604020202020204" pitchFamily="34" charset="0"/>
+              </a:rPr>
+              <a:t>10. flex-basis</a:t>
+            </a:r>
+          </a:p>
+          <a:p>
+            <a:r>
+              <a:rPr lang="en-US" sz="2000" dirty="0">
+                <a:latin typeface="Arial" panose="020B0604020202020204" pitchFamily="34" charset="0"/>
+                <a:cs typeface="Arial" panose="020B0604020202020204" pitchFamily="34" charset="0"/>
+              </a:rPr>
+              <a:t>11. align-self</a:t>
+            </a:r>
+            <a:endParaRPr lang="en-US" sz="2000" dirty="0">
+              <a:latin typeface="Arial" panose="020B0604020202020204" pitchFamily="34" charset="0"/>
+              <a:cs typeface="Arial" panose="020B0604020202020204" pitchFamily="34" charset="0"/>
+            </a:endParaRPr>
           </a:p>
         </p:txBody>
       </p:sp>
@@ -8276,6 +8717,905 @@
     <p:extLst>
       <p:ext uri="{BB962C8B-B14F-4D97-AF65-F5344CB8AC3E}">
         <p14:creationId xmlns:p14="http://schemas.microsoft.com/office/powerpoint/2010/main" val="2435350535"/>
+      </p:ext>
+    </p:extLst>
+  </p:cSld>
+  <p:clrMapOvr>
+    <a:masterClrMapping/>
+  </p:clrMapOvr>
+</p:sld>
+</file>
+
+<file path=ppt/slides/slide6.xml><?xml version="1.0" encoding="utf-8"?>
+<p:sld xmlns:a="http://schemas.openxmlformats.org/drawingml/2006/main" xmlns:r="http://schemas.openxmlformats.org/officeDocument/2006/relationships" xmlns:p="http://schemas.openxmlformats.org/presentationml/2006/main">
+  <p:cSld>
+    <p:spTree>
+      <p:nvGrpSpPr>
+        <p:cNvPr id="1" name=""/>
+        <p:cNvGrpSpPr/>
+        <p:nvPr/>
+      </p:nvGrpSpPr>
+      <p:grpSpPr>
+        <a:xfrm>
+          <a:off x="0" y="0"/>
+          <a:ext cx="0" cy="0"/>
+          <a:chOff x="0" y="0"/>
+          <a:chExt cx="0" cy="0"/>
+        </a:xfrm>
+      </p:grpSpPr>
+      <p:sp>
+        <p:nvSpPr>
+          <p:cNvPr id="2" name="Title 1"/>
+          <p:cNvSpPr>
+            <a:spLocks noGrp="1"/>
+          </p:cNvSpPr>
+          <p:nvPr>
+            <p:ph type="title"/>
+          </p:nvPr>
+        </p:nvSpPr>
+        <p:spPr>
+          <a:xfrm>
+            <a:off x="1989439" y="908316"/>
+            <a:ext cx="9614028" cy="722776"/>
+          </a:xfrm>
+        </p:spPr>
+        <p:txBody>
+          <a:bodyPr/>
+          <a:lstStyle/>
+          <a:p>
+            <a:r>
+              <a:rPr lang="en-US" dirty="0" smtClean="0">
+                <a:latin typeface="Arial" panose="020B0604020202020204" pitchFamily="34" charset="0"/>
+                <a:cs typeface="Arial" panose="020B0604020202020204" pitchFamily="34" charset="0"/>
+              </a:rPr>
+              <a:t>              Flex-Directions</a:t>
+            </a:r>
+            <a:endParaRPr lang="en-US" dirty="0">
+              <a:latin typeface="Arial" panose="020B0604020202020204" pitchFamily="34" charset="0"/>
+              <a:cs typeface="Arial" panose="020B0604020202020204" pitchFamily="34" charset="0"/>
+            </a:endParaRPr>
+          </a:p>
+        </p:txBody>
+      </p:sp>
+      <p:sp>
+        <p:nvSpPr>
+          <p:cNvPr id="3" name="Content Placeholder 2"/>
+          <p:cNvSpPr>
+            <a:spLocks noGrp="1"/>
+          </p:cNvSpPr>
+          <p:nvPr>
+            <p:ph idx="1"/>
+          </p:nvPr>
+        </p:nvSpPr>
+        <p:spPr>
+          <a:xfrm>
+            <a:off x="1890585" y="1890584"/>
+            <a:ext cx="9614027" cy="4020638"/>
+          </a:xfrm>
+        </p:spPr>
+        <p:txBody>
+          <a:bodyPr>
+            <a:normAutofit/>
+          </a:bodyPr>
+          <a:lstStyle/>
+          <a:p>
+            <a:pPr marL="0" indent="0">
+              <a:buNone/>
+            </a:pPr>
+            <a:r>
+              <a:rPr lang="en-US" dirty="0" smtClean="0"/>
+              <a:t>The </a:t>
+            </a:r>
+            <a:r>
+              <a:rPr lang="en-US" dirty="0"/>
+              <a:t>flex-direction property defines in which direction the container wants to stack the flex items</a:t>
+            </a:r>
+            <a:r>
+              <a:rPr lang="en-US" dirty="0" smtClean="0"/>
+              <a:t>.</a:t>
+            </a:r>
+            <a:endParaRPr lang="en-US" dirty="0"/>
+          </a:p>
+          <a:p>
+            <a:pPr marL="0" indent="0">
+              <a:buNone/>
+            </a:pPr>
+            <a:r>
+              <a:rPr lang="en-US" dirty="0"/>
+              <a:t>Their are different </a:t>
+            </a:r>
+            <a:r>
+              <a:rPr lang="en-US" dirty="0" smtClean="0"/>
+              <a:t>directions </a:t>
+            </a:r>
+            <a:r>
+              <a:rPr lang="en-US" dirty="0"/>
+              <a:t>we can use in this like</a:t>
+            </a:r>
+          </a:p>
+          <a:p>
+            <a:r>
+              <a:rPr lang="en-US" dirty="0"/>
+              <a:t>a. column </a:t>
+            </a:r>
+            <a:r>
+              <a:rPr lang="en-US" dirty="0" smtClean="0"/>
+              <a:t>view</a:t>
+            </a:r>
+          </a:p>
+          <a:p>
+            <a:r>
+              <a:rPr lang="en-US" dirty="0" smtClean="0"/>
+              <a:t>b</a:t>
+            </a:r>
+            <a:r>
+              <a:rPr lang="en-US" dirty="0"/>
+              <a:t>. row </a:t>
+            </a:r>
+            <a:r>
+              <a:rPr lang="en-US" dirty="0" smtClean="0"/>
+              <a:t>view</a:t>
+            </a:r>
+          </a:p>
+          <a:p>
+            <a:r>
+              <a:rPr lang="en-US" dirty="0" smtClean="0"/>
+              <a:t>c</a:t>
+            </a:r>
+            <a:r>
+              <a:rPr lang="en-US" dirty="0"/>
+              <a:t>. </a:t>
+            </a:r>
+            <a:r>
+              <a:rPr lang="en-US" dirty="0" smtClean="0"/>
+              <a:t>column-reverse</a:t>
+            </a:r>
+          </a:p>
+          <a:p>
+            <a:r>
+              <a:rPr lang="en-US" dirty="0" smtClean="0"/>
+              <a:t>d</a:t>
+            </a:r>
+            <a:r>
+              <a:rPr lang="en-US" dirty="0"/>
+              <a:t>. </a:t>
+            </a:r>
+            <a:r>
+              <a:rPr lang="en-US" dirty="0" smtClean="0"/>
+              <a:t>row-reverse</a:t>
+            </a:r>
+            <a:endParaRPr lang="en-US" dirty="0"/>
+          </a:p>
+        </p:txBody>
+      </p:sp>
+    </p:spTree>
+    <p:extLst>
+      <p:ext uri="{BB962C8B-B14F-4D97-AF65-F5344CB8AC3E}">
+        <p14:creationId xmlns:p14="http://schemas.microsoft.com/office/powerpoint/2010/main" val="3876613857"/>
+      </p:ext>
+    </p:extLst>
+  </p:cSld>
+  <p:clrMapOvr>
+    <a:masterClrMapping/>
+  </p:clrMapOvr>
+  <p:timing>
+    <p:tnLst>
+      <p:par>
+        <p:cTn id="1" dur="indefinite" restart="never" nodeType="tmRoot"/>
+      </p:par>
+    </p:tnLst>
+  </p:timing>
+</p:sld>
+</file>
+
+<file path=ppt/slides/slide7.xml><?xml version="1.0" encoding="utf-8"?>
+<p:sld xmlns:a="http://schemas.openxmlformats.org/drawingml/2006/main" xmlns:r="http://schemas.openxmlformats.org/officeDocument/2006/relationships" xmlns:p="http://schemas.openxmlformats.org/presentationml/2006/main">
+  <p:cSld>
+    <p:spTree>
+      <p:nvGrpSpPr>
+        <p:cNvPr id="1" name=""/>
+        <p:cNvGrpSpPr/>
+        <p:nvPr/>
+      </p:nvGrpSpPr>
+      <p:grpSpPr>
+        <a:xfrm>
+          <a:off x="0" y="0"/>
+          <a:ext cx="0" cy="0"/>
+          <a:chOff x="0" y="0"/>
+          <a:chExt cx="0" cy="0"/>
+        </a:xfrm>
+      </p:grpSpPr>
+      <p:sp>
+        <p:nvSpPr>
+          <p:cNvPr id="2" name="Title 1"/>
+          <p:cNvSpPr>
+            <a:spLocks noGrp="1"/>
+          </p:cNvSpPr>
+          <p:nvPr>
+            <p:ph type="title"/>
+          </p:nvPr>
+        </p:nvSpPr>
+        <p:spPr>
+          <a:xfrm>
+            <a:off x="1641455" y="290477"/>
+            <a:ext cx="8911687" cy="586852"/>
+          </a:xfrm>
+        </p:spPr>
+        <p:txBody>
+          <a:bodyPr>
+            <a:normAutofit fontScale="90000"/>
+          </a:bodyPr>
+          <a:lstStyle/>
+          <a:p>
+            <a:r>
+              <a:rPr lang="en-US" dirty="0" smtClean="0">
+                <a:latin typeface="Arial" panose="020B0604020202020204" pitchFamily="34" charset="0"/>
+                <a:cs typeface="Arial" panose="020B0604020202020204" pitchFamily="34" charset="0"/>
+              </a:rPr>
+              <a:t>Flex-Direction</a:t>
+            </a:r>
+            <a:endParaRPr lang="en-US" dirty="0">
+              <a:latin typeface="Arial" panose="020B0604020202020204" pitchFamily="34" charset="0"/>
+              <a:cs typeface="Arial" panose="020B0604020202020204" pitchFamily="34" charset="0"/>
+            </a:endParaRPr>
+          </a:p>
+        </p:txBody>
+      </p:sp>
+      <p:pic>
+        <p:nvPicPr>
+          <p:cNvPr id="4" name="Content Placeholder 3"/>
+          <p:cNvPicPr>
+            <a:picLocks noGrp="1" noChangeAspect="1"/>
+          </p:cNvPicPr>
+          <p:nvPr>
+            <p:ph idx="1"/>
+          </p:nvPr>
+        </p:nvPicPr>
+        <p:blipFill>
+          <a:blip r:embed="rId2">
+            <a:extLst>
+              <a:ext uri="{28A0092B-C50C-407E-A947-70E740481C1C}">
+                <a14:useLocalDpi xmlns:a14="http://schemas.microsoft.com/office/drawing/2010/main" val="0"/>
+              </a:ext>
+            </a:extLst>
+          </a:blip>
+          <a:stretch>
+            <a:fillRect/>
+          </a:stretch>
+        </p:blipFill>
+        <p:spPr>
+          <a:xfrm>
+            <a:off x="1641454" y="1302523"/>
+            <a:ext cx="4759345" cy="2413941"/>
+          </a:xfrm>
+        </p:spPr>
+      </p:pic>
+      <p:pic>
+        <p:nvPicPr>
+          <p:cNvPr id="5" name="Picture 4"/>
+          <p:cNvPicPr>
+            <a:picLocks noChangeAspect="1"/>
+          </p:cNvPicPr>
+          <p:nvPr/>
+        </p:nvPicPr>
+        <p:blipFill>
+          <a:blip r:embed="rId3">
+            <a:extLst>
+              <a:ext uri="{28A0092B-C50C-407E-A947-70E740481C1C}">
+                <a14:useLocalDpi xmlns:a14="http://schemas.microsoft.com/office/drawing/2010/main" val="0"/>
+              </a:ext>
+            </a:extLst>
+          </a:blip>
+          <a:stretch>
+            <a:fillRect/>
+          </a:stretch>
+        </p:blipFill>
+        <p:spPr>
+          <a:xfrm>
+            <a:off x="6894284" y="1214951"/>
+            <a:ext cx="4717143" cy="2501513"/>
+          </a:xfrm>
+          <a:prstGeom prst="rect">
+            <a:avLst/>
+          </a:prstGeom>
+        </p:spPr>
+      </p:pic>
+      <p:sp>
+        <p:nvSpPr>
+          <p:cNvPr id="6" name="TextBox 5"/>
+          <p:cNvSpPr txBox="1"/>
+          <p:nvPr/>
+        </p:nvSpPr>
+        <p:spPr>
+          <a:xfrm>
+            <a:off x="1641455" y="845619"/>
+            <a:ext cx="7255410" cy="369332"/>
+          </a:xfrm>
+          <a:prstGeom prst="rect">
+            <a:avLst/>
+          </a:prstGeom>
+          <a:noFill/>
+        </p:spPr>
+        <p:txBody>
+          <a:bodyPr wrap="square" rtlCol="0">
+            <a:spAutoFit/>
+          </a:bodyPr>
+          <a:lstStyle/>
+          <a:p>
+            <a:r>
+              <a:rPr lang="en-US" dirty="0" smtClean="0"/>
+              <a:t>Row										Column</a:t>
+            </a:r>
+            <a:endParaRPr lang="en-US" dirty="0"/>
+          </a:p>
+        </p:txBody>
+      </p:sp>
+      <p:sp>
+        <p:nvSpPr>
+          <p:cNvPr id="8" name="TextBox 7"/>
+          <p:cNvSpPr txBox="1"/>
+          <p:nvPr/>
+        </p:nvSpPr>
+        <p:spPr>
+          <a:xfrm>
+            <a:off x="1555623" y="3869420"/>
+            <a:ext cx="10055803" cy="369332"/>
+          </a:xfrm>
+          <a:prstGeom prst="rect">
+            <a:avLst/>
+          </a:prstGeom>
+          <a:noFill/>
+        </p:spPr>
+        <p:txBody>
+          <a:bodyPr wrap="square" rtlCol="0">
+            <a:spAutoFit/>
+          </a:bodyPr>
+          <a:lstStyle/>
+          <a:p>
+            <a:r>
+              <a:rPr lang="en-US" dirty="0" smtClean="0"/>
+              <a:t>Row-reverse										Column-reverse</a:t>
+            </a:r>
+            <a:endParaRPr lang="en-US" dirty="0"/>
+          </a:p>
+        </p:txBody>
+      </p:sp>
+      <p:pic>
+        <p:nvPicPr>
+          <p:cNvPr id="9" name="Picture 8"/>
+          <p:cNvPicPr>
+            <a:picLocks noChangeAspect="1"/>
+          </p:cNvPicPr>
+          <p:nvPr/>
+        </p:nvPicPr>
+        <p:blipFill>
+          <a:blip r:embed="rId4">
+            <a:extLst>
+              <a:ext uri="{28A0092B-C50C-407E-A947-70E740481C1C}">
+                <a14:useLocalDpi xmlns:a14="http://schemas.microsoft.com/office/drawing/2010/main" val="0"/>
+              </a:ext>
+            </a:extLst>
+          </a:blip>
+          <a:stretch>
+            <a:fillRect/>
+          </a:stretch>
+        </p:blipFill>
+        <p:spPr>
+          <a:xfrm>
+            <a:off x="1555624" y="4238752"/>
+            <a:ext cx="4845175" cy="2470953"/>
+          </a:xfrm>
+          <a:prstGeom prst="rect">
+            <a:avLst/>
+          </a:prstGeom>
+        </p:spPr>
+      </p:pic>
+      <p:pic>
+        <p:nvPicPr>
+          <p:cNvPr id="10" name="Picture 9"/>
+          <p:cNvPicPr>
+            <a:picLocks noChangeAspect="1"/>
+          </p:cNvPicPr>
+          <p:nvPr/>
+        </p:nvPicPr>
+        <p:blipFill>
+          <a:blip r:embed="rId5">
+            <a:extLst>
+              <a:ext uri="{28A0092B-C50C-407E-A947-70E740481C1C}">
+                <a14:useLocalDpi xmlns:a14="http://schemas.microsoft.com/office/drawing/2010/main" val="0"/>
+              </a:ext>
+            </a:extLst>
+          </a:blip>
+          <a:stretch>
+            <a:fillRect/>
+          </a:stretch>
+        </p:blipFill>
+        <p:spPr>
+          <a:xfrm>
+            <a:off x="6894285" y="4243937"/>
+            <a:ext cx="4717143" cy="2464618"/>
+          </a:xfrm>
+          <a:prstGeom prst="rect">
+            <a:avLst/>
+          </a:prstGeom>
+        </p:spPr>
+      </p:pic>
+    </p:spTree>
+    <p:extLst>
+      <p:ext uri="{BB962C8B-B14F-4D97-AF65-F5344CB8AC3E}">
+        <p14:creationId xmlns:p14="http://schemas.microsoft.com/office/powerpoint/2010/main" val="3835872068"/>
+      </p:ext>
+    </p:extLst>
+  </p:cSld>
+  <p:clrMapOvr>
+    <a:masterClrMapping/>
+  </p:clrMapOvr>
+  <p:timing>
+    <p:tnLst>
+      <p:par>
+        <p:cTn id="1" dur="indefinite" restart="never" nodeType="tmRoot"/>
+      </p:par>
+    </p:tnLst>
+  </p:timing>
+</p:sld>
+</file>
+
+<file path=ppt/slides/slide8.xml><?xml version="1.0" encoding="utf-8"?>
+<p:sld xmlns:a="http://schemas.openxmlformats.org/drawingml/2006/main" xmlns:r="http://schemas.openxmlformats.org/officeDocument/2006/relationships" xmlns:p="http://schemas.openxmlformats.org/presentationml/2006/main">
+  <p:cSld>
+    <p:spTree>
+      <p:nvGrpSpPr>
+        <p:cNvPr id="1" name=""/>
+        <p:cNvGrpSpPr/>
+        <p:nvPr/>
+      </p:nvGrpSpPr>
+      <p:grpSpPr>
+        <a:xfrm>
+          <a:off x="0" y="0"/>
+          <a:ext cx="0" cy="0"/>
+          <a:chOff x="0" y="0"/>
+          <a:chExt cx="0" cy="0"/>
+        </a:xfrm>
+      </p:grpSpPr>
+      <p:sp>
+        <p:nvSpPr>
+          <p:cNvPr id="2" name="Title 1"/>
+          <p:cNvSpPr>
+            <a:spLocks noGrp="1"/>
+          </p:cNvSpPr>
+          <p:nvPr>
+            <p:ph type="title"/>
+          </p:nvPr>
+        </p:nvSpPr>
+        <p:spPr>
+          <a:xfrm>
+            <a:off x="1567543" y="0"/>
+            <a:ext cx="9791926" cy="682176"/>
+          </a:xfrm>
+        </p:spPr>
+        <p:txBody>
+          <a:bodyPr/>
+          <a:lstStyle/>
+          <a:p>
+            <a:r>
+              <a:rPr lang="en-US" dirty="0" smtClean="0">
+                <a:latin typeface="Arial" panose="020B0604020202020204" pitchFamily="34" charset="0"/>
+                <a:cs typeface="Arial" panose="020B0604020202020204" pitchFamily="34" charset="0"/>
+              </a:rPr>
+              <a:t>Flex-wrap</a:t>
+            </a:r>
+            <a:endParaRPr lang="en-US" dirty="0">
+              <a:latin typeface="Arial" panose="020B0604020202020204" pitchFamily="34" charset="0"/>
+              <a:cs typeface="Arial" panose="020B0604020202020204" pitchFamily="34" charset="0"/>
+            </a:endParaRPr>
+          </a:p>
+        </p:txBody>
+      </p:sp>
+      <p:sp>
+        <p:nvSpPr>
+          <p:cNvPr id="3" name="Content Placeholder 2"/>
+          <p:cNvSpPr>
+            <a:spLocks noGrp="1"/>
+          </p:cNvSpPr>
+          <p:nvPr>
+            <p:ph idx="1"/>
+          </p:nvPr>
+        </p:nvSpPr>
+        <p:spPr>
+          <a:xfrm>
+            <a:off x="1436914" y="566057"/>
+            <a:ext cx="10755085" cy="6183086"/>
+          </a:xfrm>
+        </p:spPr>
+        <p:txBody>
+          <a:bodyPr>
+            <a:normAutofit/>
+          </a:bodyPr>
+          <a:lstStyle/>
+          <a:p>
+            <a:pPr marL="0" indent="0">
+              <a:buNone/>
+            </a:pPr>
+            <a:r>
+              <a:rPr lang="en-US" sz="2400" dirty="0">
+                <a:latin typeface="Arial" panose="020B0604020202020204" pitchFamily="34" charset="0"/>
+                <a:cs typeface="Arial" panose="020B0604020202020204" pitchFamily="34" charset="0"/>
+              </a:rPr>
+              <a:t>The flex-wrap property specifies whether the flex items should wrap or not</a:t>
+            </a:r>
+            <a:r>
+              <a:rPr lang="en-US" sz="2400" dirty="0" smtClean="0">
+                <a:latin typeface="Arial" panose="020B0604020202020204" pitchFamily="34" charset="0"/>
+                <a:cs typeface="Arial" panose="020B0604020202020204" pitchFamily="34" charset="0"/>
+              </a:rPr>
+              <a:t>.</a:t>
+            </a:r>
+            <a:endParaRPr lang="en-US" sz="2400" dirty="0">
+              <a:latin typeface="Arial" panose="020B0604020202020204" pitchFamily="34" charset="0"/>
+              <a:cs typeface="Arial" panose="020B0604020202020204" pitchFamily="34" charset="0"/>
+            </a:endParaRPr>
+          </a:p>
+          <a:p>
+            <a:r>
+              <a:rPr lang="en-US" sz="2400" dirty="0" smtClean="0">
+                <a:latin typeface="Arial" panose="020B0604020202020204" pitchFamily="34" charset="0"/>
+                <a:cs typeface="Arial" panose="020B0604020202020204" pitchFamily="34" charset="0"/>
+              </a:rPr>
+              <a:t>a</a:t>
+            </a:r>
+            <a:r>
+              <a:rPr lang="en-US" sz="2400" dirty="0">
+                <a:latin typeface="Arial" panose="020B0604020202020204" pitchFamily="34" charset="0"/>
+                <a:cs typeface="Arial" panose="020B0604020202020204" pitchFamily="34" charset="0"/>
+              </a:rPr>
+              <a:t>. </a:t>
+            </a:r>
+            <a:r>
+              <a:rPr lang="en-US" sz="2400" dirty="0" smtClean="0">
+                <a:latin typeface="Arial" panose="020B0604020202020204" pitchFamily="34" charset="0"/>
+                <a:cs typeface="Arial" panose="020B0604020202020204" pitchFamily="34" charset="0"/>
+              </a:rPr>
+              <a:t>wrap                        						nowrap</a:t>
+            </a:r>
+          </a:p>
+          <a:p>
+            <a:pPr marL="0" indent="0">
+              <a:buNone/>
+            </a:pPr>
+            <a:endParaRPr lang="en-US" sz="2400" dirty="0" smtClean="0">
+              <a:latin typeface="Arial" panose="020B0604020202020204" pitchFamily="34" charset="0"/>
+              <a:cs typeface="Arial" panose="020B0604020202020204" pitchFamily="34" charset="0"/>
+            </a:endParaRPr>
+          </a:p>
+          <a:p>
+            <a:pPr marL="0" indent="0">
+              <a:buNone/>
+            </a:pPr>
+            <a:endParaRPr lang="en-US" sz="2400" dirty="0">
+              <a:latin typeface="Arial" panose="020B0604020202020204" pitchFamily="34" charset="0"/>
+              <a:cs typeface="Arial" panose="020B0604020202020204" pitchFamily="34" charset="0"/>
+            </a:endParaRPr>
+          </a:p>
+          <a:p>
+            <a:pPr marL="0" indent="0">
+              <a:buNone/>
+            </a:pPr>
+            <a:endParaRPr lang="en-US" sz="2400" dirty="0" smtClean="0">
+              <a:latin typeface="Arial" panose="020B0604020202020204" pitchFamily="34" charset="0"/>
+              <a:cs typeface="Arial" panose="020B0604020202020204" pitchFamily="34" charset="0"/>
+            </a:endParaRPr>
+          </a:p>
+          <a:p>
+            <a:pPr marL="0" indent="0">
+              <a:buNone/>
+            </a:pPr>
+            <a:endParaRPr lang="en-US" sz="2400" dirty="0" smtClean="0">
+              <a:latin typeface="Arial" panose="020B0604020202020204" pitchFamily="34" charset="0"/>
+              <a:cs typeface="Arial" panose="020B0604020202020204" pitchFamily="34" charset="0"/>
+            </a:endParaRPr>
+          </a:p>
+          <a:p>
+            <a:pPr marL="0" indent="0">
+              <a:buNone/>
+            </a:pPr>
+            <a:endParaRPr lang="en-US" sz="2400" dirty="0" smtClean="0">
+              <a:latin typeface="Arial" panose="020B0604020202020204" pitchFamily="34" charset="0"/>
+              <a:cs typeface="Arial" panose="020B0604020202020204" pitchFamily="34" charset="0"/>
+            </a:endParaRPr>
+          </a:p>
+          <a:p>
+            <a:pPr lvl="8"/>
+            <a:r>
+              <a:rPr lang="en-US" sz="1800" dirty="0" smtClean="0">
+                <a:latin typeface="Arial" panose="020B0604020202020204" pitchFamily="34" charset="0"/>
+                <a:cs typeface="Arial" panose="020B0604020202020204" pitchFamily="34" charset="0"/>
+              </a:rPr>
+              <a:t>wrap-reverse									</a:t>
+            </a:r>
+            <a:endParaRPr lang="en-US" sz="1800" dirty="0">
+              <a:latin typeface="Arial" panose="020B0604020202020204" pitchFamily="34" charset="0"/>
+              <a:cs typeface="Arial" panose="020B0604020202020204" pitchFamily="34" charset="0"/>
+            </a:endParaRPr>
+          </a:p>
+        </p:txBody>
+      </p:sp>
+      <p:pic>
+        <p:nvPicPr>
+          <p:cNvPr id="4" name="Picture 3"/>
+          <p:cNvPicPr>
+            <a:picLocks noChangeAspect="1"/>
+          </p:cNvPicPr>
+          <p:nvPr/>
+        </p:nvPicPr>
+        <p:blipFill>
+          <a:blip r:embed="rId2">
+            <a:extLst>
+              <a:ext uri="{28A0092B-C50C-407E-A947-70E740481C1C}">
+                <a14:useLocalDpi xmlns:a14="http://schemas.microsoft.com/office/drawing/2010/main" val="0"/>
+              </a:ext>
+            </a:extLst>
+          </a:blip>
+          <a:stretch>
+            <a:fillRect/>
+          </a:stretch>
+        </p:blipFill>
+        <p:spPr>
+          <a:xfrm>
+            <a:off x="986971" y="1567549"/>
+            <a:ext cx="4557485" cy="2307771"/>
+          </a:xfrm>
+          <a:prstGeom prst="rect">
+            <a:avLst/>
+          </a:prstGeom>
+        </p:spPr>
+      </p:pic>
+      <p:pic>
+        <p:nvPicPr>
+          <p:cNvPr id="5" name="Picture 4"/>
+          <p:cNvPicPr>
+            <a:picLocks noChangeAspect="1"/>
+          </p:cNvPicPr>
+          <p:nvPr/>
+        </p:nvPicPr>
+        <p:blipFill>
+          <a:blip r:embed="rId3">
+            <a:extLst>
+              <a:ext uri="{28A0092B-C50C-407E-A947-70E740481C1C}">
+                <a14:useLocalDpi xmlns:a14="http://schemas.microsoft.com/office/drawing/2010/main" val="0"/>
+              </a:ext>
+            </a:extLst>
+          </a:blip>
+          <a:stretch>
+            <a:fillRect/>
+          </a:stretch>
+        </p:blipFill>
+        <p:spPr>
+          <a:xfrm>
+            <a:off x="5994399" y="1589318"/>
+            <a:ext cx="5365070" cy="2307771"/>
+          </a:xfrm>
+          <a:prstGeom prst="rect">
+            <a:avLst/>
+          </a:prstGeom>
+        </p:spPr>
+      </p:pic>
+      <p:pic>
+        <p:nvPicPr>
+          <p:cNvPr id="7" name="Picture 6"/>
+          <p:cNvPicPr>
+            <a:picLocks noChangeAspect="1"/>
+          </p:cNvPicPr>
+          <p:nvPr/>
+        </p:nvPicPr>
+        <p:blipFill>
+          <a:blip r:embed="rId4">
+            <a:extLst>
+              <a:ext uri="{28A0092B-C50C-407E-A947-70E740481C1C}">
+                <a14:useLocalDpi xmlns:a14="http://schemas.microsoft.com/office/drawing/2010/main" val="0"/>
+              </a:ext>
+            </a:extLst>
+          </a:blip>
+          <a:stretch>
+            <a:fillRect/>
+          </a:stretch>
+        </p:blipFill>
+        <p:spPr>
+          <a:xfrm>
+            <a:off x="3715656" y="4397829"/>
+            <a:ext cx="4557485" cy="2351314"/>
+          </a:xfrm>
+          <a:prstGeom prst="rect">
+            <a:avLst/>
+          </a:prstGeom>
+        </p:spPr>
+      </p:pic>
+    </p:spTree>
+    <p:extLst>
+      <p:ext uri="{BB962C8B-B14F-4D97-AF65-F5344CB8AC3E}">
+        <p14:creationId xmlns:p14="http://schemas.microsoft.com/office/powerpoint/2010/main" val="3783275940"/>
+      </p:ext>
+    </p:extLst>
+  </p:cSld>
+  <p:clrMapOvr>
+    <a:masterClrMapping/>
+  </p:clrMapOvr>
+  <p:timing>
+    <p:tnLst>
+      <p:par>
+        <p:cTn id="1" dur="indefinite" restart="never" nodeType="tmRoot"/>
+      </p:par>
+    </p:tnLst>
+  </p:timing>
+</p:sld>
+</file>
+
+<file path=ppt/slides/slide9.xml><?xml version="1.0" encoding="utf-8"?>
+<p:sld xmlns:a="http://schemas.openxmlformats.org/drawingml/2006/main" xmlns:r="http://schemas.openxmlformats.org/officeDocument/2006/relationships" xmlns:p="http://schemas.openxmlformats.org/presentationml/2006/main">
+  <p:cSld>
+    <p:spTree>
+      <p:nvGrpSpPr>
+        <p:cNvPr id="1" name=""/>
+        <p:cNvGrpSpPr/>
+        <p:nvPr/>
+      </p:nvGrpSpPr>
+      <p:grpSpPr>
+        <a:xfrm>
+          <a:off x="0" y="0"/>
+          <a:ext cx="0" cy="0"/>
+          <a:chOff x="0" y="0"/>
+          <a:chExt cx="0" cy="0"/>
+        </a:xfrm>
+      </p:grpSpPr>
+      <p:sp>
+        <p:nvSpPr>
+          <p:cNvPr id="2" name="Title 1"/>
+          <p:cNvSpPr>
+            <a:spLocks noGrp="1"/>
+          </p:cNvSpPr>
+          <p:nvPr>
+            <p:ph type="title"/>
+          </p:nvPr>
+        </p:nvSpPr>
+        <p:spPr/>
+        <p:txBody>
+          <a:bodyPr/>
+          <a:lstStyle/>
+          <a:p>
+            <a:r>
+              <a:rPr lang="en-US" dirty="0" smtClean="0">
+                <a:latin typeface="Arial" panose="020B0604020202020204" pitchFamily="34" charset="0"/>
+                <a:cs typeface="Arial" panose="020B0604020202020204" pitchFamily="34" charset="0"/>
+              </a:rPr>
+              <a:t>Justify </a:t>
+            </a:r>
+            <a:r>
+              <a:rPr lang="en-US" dirty="0">
+                <a:latin typeface="Arial" panose="020B0604020202020204" pitchFamily="34" charset="0"/>
+                <a:cs typeface="Arial" panose="020B0604020202020204" pitchFamily="34" charset="0"/>
+              </a:rPr>
+              <a:t>contents</a:t>
+            </a:r>
+            <a:endParaRPr lang="en-US" dirty="0">
+              <a:latin typeface="Arial" panose="020B0604020202020204" pitchFamily="34" charset="0"/>
+              <a:cs typeface="Arial" panose="020B0604020202020204" pitchFamily="34" charset="0"/>
+            </a:endParaRPr>
+          </a:p>
+        </p:txBody>
+      </p:sp>
+      <p:sp>
+        <p:nvSpPr>
+          <p:cNvPr id="3" name="Content Placeholder 2"/>
+          <p:cNvSpPr>
+            <a:spLocks noGrp="1"/>
+          </p:cNvSpPr>
+          <p:nvPr>
+            <p:ph idx="1"/>
+          </p:nvPr>
+        </p:nvSpPr>
+        <p:spPr>
+          <a:xfrm>
+            <a:off x="1233714" y="1567543"/>
+            <a:ext cx="10270898" cy="4343679"/>
+          </a:xfrm>
+        </p:spPr>
+        <p:txBody>
+          <a:bodyPr>
+            <a:normAutofit/>
+          </a:bodyPr>
+          <a:lstStyle/>
+          <a:p>
+            <a:pPr marL="0" indent="0">
+              <a:buNone/>
+            </a:pPr>
+            <a:r>
+              <a:rPr lang="en-US" sz="2400" dirty="0">
+                <a:latin typeface="Arial" panose="020B0604020202020204" pitchFamily="34" charset="0"/>
+                <a:cs typeface="Arial" panose="020B0604020202020204" pitchFamily="34" charset="0"/>
+              </a:rPr>
+              <a:t>The justify-content property is used to align the flex items. The alignment can be done on the items in that division</a:t>
+            </a:r>
+            <a:r>
+              <a:rPr lang="en-US" sz="2400" dirty="0" smtClean="0">
+                <a:latin typeface="Arial" panose="020B0604020202020204" pitchFamily="34" charset="0"/>
+                <a:cs typeface="Arial" panose="020B0604020202020204" pitchFamily="34" charset="0"/>
+              </a:rPr>
+              <a:t>.</a:t>
+            </a:r>
+            <a:endParaRPr lang="en-US" sz="2400" dirty="0">
+              <a:latin typeface="Arial" panose="020B0604020202020204" pitchFamily="34" charset="0"/>
+              <a:cs typeface="Arial" panose="020B0604020202020204" pitchFamily="34" charset="0"/>
+            </a:endParaRPr>
+          </a:p>
+          <a:p>
+            <a:pPr marL="0" indent="0">
+              <a:buNone/>
+            </a:pPr>
+            <a:r>
+              <a:rPr lang="en-US" sz="2400" b="1" dirty="0">
+                <a:latin typeface="Arial" panose="020B0604020202020204" pitchFamily="34" charset="0"/>
+                <a:cs typeface="Arial" panose="020B0604020202020204" pitchFamily="34" charset="0"/>
+              </a:rPr>
+              <a:t>Properties:</a:t>
+            </a:r>
+          </a:p>
+          <a:p>
+            <a:r>
+              <a:rPr lang="en-US" sz="2400" dirty="0">
+                <a:latin typeface="Arial" panose="020B0604020202020204" pitchFamily="34" charset="0"/>
+                <a:cs typeface="Arial" panose="020B0604020202020204" pitchFamily="34" charset="0"/>
+              </a:rPr>
+              <a:t>a. center</a:t>
+            </a:r>
+          </a:p>
+          <a:p>
+            <a:r>
+              <a:rPr lang="en-US" sz="2400" dirty="0">
+                <a:latin typeface="Arial" panose="020B0604020202020204" pitchFamily="34" charset="0"/>
+                <a:cs typeface="Arial" panose="020B0604020202020204" pitchFamily="34" charset="0"/>
+              </a:rPr>
+              <a:t>b. flex-start</a:t>
+            </a:r>
+          </a:p>
+          <a:p>
+            <a:r>
+              <a:rPr lang="en-US" sz="2400" dirty="0">
+                <a:latin typeface="Arial" panose="020B0604020202020204" pitchFamily="34" charset="0"/>
+                <a:cs typeface="Arial" panose="020B0604020202020204" pitchFamily="34" charset="0"/>
+              </a:rPr>
+              <a:t>c. flex-end</a:t>
+            </a:r>
+          </a:p>
+          <a:p>
+            <a:r>
+              <a:rPr lang="en-US" sz="2400" dirty="0">
+                <a:latin typeface="Arial" panose="020B0604020202020204" pitchFamily="34" charset="0"/>
+                <a:cs typeface="Arial" panose="020B0604020202020204" pitchFamily="34" charset="0"/>
+              </a:rPr>
+              <a:t>d. space- around</a:t>
+            </a:r>
+          </a:p>
+          <a:p>
+            <a:r>
+              <a:rPr lang="en-US" sz="2400" dirty="0">
+                <a:latin typeface="Arial" panose="020B0604020202020204" pitchFamily="34" charset="0"/>
+                <a:cs typeface="Arial" panose="020B0604020202020204" pitchFamily="34" charset="0"/>
+              </a:rPr>
+              <a:t>e. </a:t>
+            </a:r>
+            <a:r>
+              <a:rPr lang="en-US" sz="2400" dirty="0" smtClean="0">
+                <a:latin typeface="Arial" panose="020B0604020202020204" pitchFamily="34" charset="0"/>
+                <a:cs typeface="Arial" panose="020B0604020202020204" pitchFamily="34" charset="0"/>
+              </a:rPr>
+              <a:t>space-between</a:t>
+            </a:r>
+          </a:p>
+        </p:txBody>
+      </p:sp>
+    </p:spTree>
+    <p:extLst>
+      <p:ext uri="{BB962C8B-B14F-4D97-AF65-F5344CB8AC3E}">
+        <p14:creationId xmlns:p14="http://schemas.microsoft.com/office/powerpoint/2010/main" val="4132483061"/>
       </p:ext>
     </p:extLst>
   </p:cSld>

</xml_diff>

<commit_message>
updated the names of the group members
</commit_message>
<xml_diff>
--- a/Group No.pptx
+++ b/Group No.pptx
@@ -322,7 +322,7 @@
             <a:fld id="{B61BEF0D-F0BB-DE4B-95CE-6DB70DBA9567}" type="datetimeFigureOut">
               <a:rPr lang="en-US" dirty="0"/>
               <a:pPr/>
-              <a:t>9/18/2019</a:t>
+              <a:t>9/19/2019</a:t>
             </a:fld>
             <a:endParaRPr lang="en-US" dirty="0"/>
           </a:p>
@@ -657,7 +657,7 @@
             <a:fld id="{B61BEF0D-F0BB-DE4B-95CE-6DB70DBA9567}" type="datetimeFigureOut">
               <a:rPr lang="en-US" dirty="0"/>
               <a:pPr/>
-              <a:t>9/18/2019</a:t>
+              <a:t>9/19/2019</a:t>
             </a:fld>
             <a:endParaRPr lang="en-US" dirty="0"/>
           </a:p>
@@ -1055,7 +1055,7 @@
             <a:fld id="{B61BEF0D-F0BB-DE4B-95CE-6DB70DBA9567}" type="datetimeFigureOut">
               <a:rPr lang="en-US" dirty="0"/>
               <a:pPr/>
-              <a:t>9/18/2019</a:t>
+              <a:t>9/19/2019</a:t>
             </a:fld>
             <a:endParaRPr lang="en-US" dirty="0"/>
           </a:p>
@@ -1388,7 +1388,7 @@
             <a:fld id="{B61BEF0D-F0BB-DE4B-95CE-6DB70DBA9567}" type="datetimeFigureOut">
               <a:rPr lang="en-US" dirty="0"/>
               <a:pPr/>
-              <a:t>9/18/2019</a:t>
+              <a:t>9/19/2019</a:t>
             </a:fld>
             <a:endParaRPr lang="en-US" dirty="0"/>
           </a:p>
@@ -1705,7 +1705,7 @@
             <a:fld id="{B61BEF0D-F0BB-DE4B-95CE-6DB70DBA9567}" type="datetimeFigureOut">
               <a:rPr lang="en-US" dirty="0"/>
               <a:pPr/>
-              <a:t>9/18/2019</a:t>
+              <a:t>9/19/2019</a:t>
             </a:fld>
             <a:endParaRPr lang="en-US" dirty="0"/>
           </a:p>
@@ -2098,7 +2098,7 @@
             <a:fld id="{B61BEF0D-F0BB-DE4B-95CE-6DB70DBA9567}" type="datetimeFigureOut">
               <a:rPr lang="en-US" dirty="0"/>
               <a:pPr/>
-              <a:t>9/18/2019</a:t>
+              <a:t>9/19/2019</a:t>
             </a:fld>
             <a:endParaRPr lang="en-US" dirty="0"/>
           </a:p>
@@ -2352,7 +2352,7 @@
             <a:fld id="{B61BEF0D-F0BB-DE4B-95CE-6DB70DBA9567}" type="datetimeFigureOut">
               <a:rPr lang="en-US" dirty="0"/>
               <a:pPr/>
-              <a:t>9/18/2019</a:t>
+              <a:t>9/19/2019</a:t>
             </a:fld>
             <a:endParaRPr lang="en-US" dirty="0"/>
           </a:p>
@@ -2611,7 +2611,7 @@
             <a:fld id="{B61BEF0D-F0BB-DE4B-95CE-6DB70DBA9567}" type="datetimeFigureOut">
               <a:rPr lang="en-US" dirty="0"/>
               <a:pPr/>
-              <a:t>9/18/2019</a:t>
+              <a:t>9/19/2019</a:t>
             </a:fld>
             <a:endParaRPr lang="en-US" dirty="0"/>
           </a:p>
@@ -2870,7 +2870,7 @@
             <a:fld id="{B61BEF0D-F0BB-DE4B-95CE-6DB70DBA9567}" type="datetimeFigureOut">
               <a:rPr lang="en-US" dirty="0"/>
               <a:pPr/>
-              <a:t>9/18/2019</a:t>
+              <a:t>9/19/2019</a:t>
             </a:fld>
             <a:endParaRPr lang="en-US" dirty="0"/>
           </a:p>
@@ -3196,7 +3196,7 @@
             <a:fld id="{B61BEF0D-F0BB-DE4B-95CE-6DB70DBA9567}" type="datetimeFigureOut">
               <a:rPr lang="en-US" dirty="0"/>
               <a:pPr/>
-              <a:t>9/18/2019</a:t>
+              <a:t>9/19/2019</a:t>
             </a:fld>
             <a:endParaRPr lang="en-US" dirty="0"/>
           </a:p>
@@ -3516,7 +3516,7 @@
             <a:fld id="{B61BEF0D-F0BB-DE4B-95CE-6DB70DBA9567}" type="datetimeFigureOut">
               <a:rPr lang="en-US" dirty="0"/>
               <a:pPr/>
-              <a:t>9/18/2019</a:t>
+              <a:t>9/19/2019</a:t>
             </a:fld>
             <a:endParaRPr lang="en-US" dirty="0"/>
           </a:p>
@@ -3970,7 +3970,7 @@
             <a:fld id="{B61BEF0D-F0BB-DE4B-95CE-6DB70DBA9567}" type="datetimeFigureOut">
               <a:rPr lang="en-US" dirty="0"/>
               <a:pPr/>
-              <a:t>9/18/2019</a:t>
+              <a:t>9/19/2019</a:t>
             </a:fld>
             <a:endParaRPr lang="en-US" dirty="0"/>
           </a:p>
@@ -4172,7 +4172,7 @@
             <a:fld id="{B61BEF0D-F0BB-DE4B-95CE-6DB70DBA9567}" type="datetimeFigureOut">
               <a:rPr lang="en-US" dirty="0"/>
               <a:pPr/>
-              <a:t>9/18/2019</a:t>
+              <a:t>9/19/2019</a:t>
             </a:fld>
             <a:endParaRPr lang="en-US" dirty="0"/>
           </a:p>
@@ -4346,7 +4346,7 @@
             <a:fld id="{B61BEF0D-F0BB-DE4B-95CE-6DB70DBA9567}" type="datetimeFigureOut">
               <a:rPr lang="en-US" dirty="0"/>
               <a:pPr/>
-              <a:t>9/18/2019</a:t>
+              <a:t>9/19/2019</a:t>
             </a:fld>
             <a:endParaRPr lang="en-US" dirty="0"/>
           </a:p>
@@ -4676,7 +4676,7 @@
             <a:fld id="{B61BEF0D-F0BB-DE4B-95CE-6DB70DBA9567}" type="datetimeFigureOut">
               <a:rPr lang="en-US" dirty="0"/>
               <a:pPr/>
-              <a:t>9/18/2019</a:t>
+              <a:t>9/19/2019</a:t>
             </a:fld>
             <a:endParaRPr lang="en-US" dirty="0"/>
           </a:p>
@@ -5018,7 +5018,7 @@
             <a:fld id="{B61BEF0D-F0BB-DE4B-95CE-6DB70DBA9567}" type="datetimeFigureOut">
               <a:rPr lang="en-US" dirty="0"/>
               <a:pPr/>
-              <a:t>9/18/2019</a:t>
+              <a:t>9/19/2019</a:t>
             </a:fld>
             <a:endParaRPr lang="en-US" dirty="0"/>
           </a:p>
@@ -7132,7 +7132,7 @@
             <a:fld id="{B61BEF0D-F0BB-DE4B-95CE-6DB70DBA9567}" type="datetimeFigureOut">
               <a:rPr lang="en-US" dirty="0"/>
               <a:pPr/>
-              <a:t>9/18/2019</a:t>
+              <a:t>9/19/2019</a:t>
             </a:fld>
             <a:endParaRPr lang="en-US" dirty="0"/>
           </a:p>
@@ -8048,6 +8048,56 @@
           </a:p>
         </p:txBody>
       </p:sp>
+      <p:sp>
+        <p:nvSpPr>
+          <p:cNvPr id="7" name="TextBox 6"/>
+          <p:cNvSpPr txBox="1"/>
+          <p:nvPr/>
+        </p:nvSpPr>
+        <p:spPr>
+          <a:xfrm>
+            <a:off x="8915764" y="6396335"/>
+            <a:ext cx="3396343" cy="461665"/>
+          </a:xfrm>
+          <a:prstGeom prst="rect">
+            <a:avLst/>
+          </a:prstGeom>
+          <a:noFill/>
+        </p:spPr>
+        <p:txBody>
+          <a:bodyPr wrap="square" rtlCol="0">
+            <a:spAutoFit/>
+          </a:bodyPr>
+          <a:lstStyle/>
+          <a:p>
+            <a:r>
+              <a:rPr lang="en-US" sz="2400" dirty="0" smtClean="0">
+                <a:latin typeface="Arial" panose="020B0604020202020204" pitchFamily="34" charset="0"/>
+                <a:cs typeface="Arial" panose="020B0604020202020204" pitchFamily="34" charset="0"/>
+              </a:rPr>
+              <a:t>Akhitha</a:t>
+            </a:r>
+            <a:r>
+              <a:rPr lang="en-US" dirty="0" smtClean="0">
+                <a:latin typeface="Arial" panose="020B0604020202020204" pitchFamily="34" charset="0"/>
+                <a:cs typeface="Arial" panose="020B0604020202020204" pitchFamily="34" charset="0"/>
+              </a:rPr>
+              <a:t> </a:t>
+            </a:r>
+            <a:r>
+              <a:rPr lang="en-US" sz="2400" dirty="0" smtClean="0">
+                <a:latin typeface="Arial" panose="020B0604020202020204" pitchFamily="34" charset="0"/>
+                <a:cs typeface="Arial" panose="020B0604020202020204" pitchFamily="34" charset="0"/>
+              </a:rPr>
+              <a:t>Tumula</a:t>
+            </a:r>
+            <a:endParaRPr lang="en-US" sz="2400" dirty="0">
+              <a:latin typeface="Arial" panose="020B0604020202020204" pitchFamily="34" charset="0"/>
+              <a:cs typeface="Arial" panose="020B0604020202020204" pitchFamily="34" charset="0"/>
+            </a:endParaRPr>
+          </a:p>
+        </p:txBody>
+      </p:sp>
     </p:spTree>
     <p:extLst>
       <p:ext uri="{BB962C8B-B14F-4D97-AF65-F5344CB8AC3E}">
@@ -8090,7 +8140,7 @@
         </p:nvSpPr>
         <p:spPr>
           <a:xfrm>
-            <a:off x="1605954" y="174167"/>
+            <a:off x="1640156" y="0"/>
             <a:ext cx="8911687" cy="725719"/>
           </a:xfrm>
         </p:spPr>
@@ -8133,7 +8183,7 @@
         </p:blipFill>
         <p:spPr>
           <a:xfrm>
-            <a:off x="790540" y="1393370"/>
+            <a:off x="751351" y="1210490"/>
             <a:ext cx="5073231" cy="2286907"/>
           </a:xfrm>
         </p:spPr>
@@ -8160,7 +8210,7 @@
         </p:blipFill>
         <p:spPr>
           <a:xfrm>
-            <a:off x="6357257" y="1393370"/>
+            <a:off x="6278879" y="1210490"/>
             <a:ext cx="5704113" cy="2286907"/>
           </a:xfrm>
           <a:prstGeom prst="rect">
@@ -8190,7 +8240,7 @@
         </p:blipFill>
         <p:spPr>
           <a:xfrm>
-            <a:off x="688939" y="4173761"/>
+            <a:off x="715065" y="3977818"/>
             <a:ext cx="5174832" cy="2415725"/>
           </a:xfrm>
           <a:prstGeom prst="rect">
@@ -8220,7 +8270,7 @@
         </p:blipFill>
         <p:spPr>
           <a:xfrm>
-            <a:off x="6357257" y="4173761"/>
+            <a:off x="6357257" y="3990881"/>
             <a:ext cx="5704114" cy="2415725"/>
           </a:xfrm>
           <a:prstGeom prst="rect">
@@ -8236,7 +8286,7 @@
         </p:nvSpPr>
         <p:spPr>
           <a:xfrm>
-            <a:off x="1865085" y="961962"/>
+            <a:off x="1812834" y="739893"/>
             <a:ext cx="8984343" cy="461665"/>
           </a:xfrm>
           <a:prstGeom prst="rect">
@@ -8272,7 +8322,7 @@
         </p:nvSpPr>
         <p:spPr>
           <a:xfrm>
-            <a:off x="1865084" y="3747473"/>
+            <a:off x="1891209" y="3512342"/>
             <a:ext cx="8984343" cy="461665"/>
           </a:xfrm>
           <a:prstGeom prst="rect">
@@ -8292,6 +8342,56 @@
                 <a:cs typeface="Arial" panose="020B0604020202020204" pitchFamily="34" charset="0"/>
               </a:rPr>
               <a:t>Row-start								Template-column </a:t>
+            </a:r>
+            <a:endParaRPr lang="en-US" sz="2400" dirty="0">
+              <a:latin typeface="Arial" panose="020B0604020202020204" pitchFamily="34" charset="0"/>
+              <a:cs typeface="Arial" panose="020B0604020202020204" pitchFamily="34" charset="0"/>
+            </a:endParaRPr>
+          </a:p>
+        </p:txBody>
+      </p:sp>
+      <p:sp>
+        <p:nvSpPr>
+          <p:cNvPr id="11" name="TextBox 10"/>
+          <p:cNvSpPr txBox="1"/>
+          <p:nvPr/>
+        </p:nvSpPr>
+        <p:spPr>
+          <a:xfrm>
+            <a:off x="8242664" y="6396335"/>
+            <a:ext cx="3396343" cy="461665"/>
+          </a:xfrm>
+          <a:prstGeom prst="rect">
+            <a:avLst/>
+          </a:prstGeom>
+          <a:noFill/>
+        </p:spPr>
+        <p:txBody>
+          <a:bodyPr wrap="square" rtlCol="0">
+            <a:spAutoFit/>
+          </a:bodyPr>
+          <a:lstStyle/>
+          <a:p>
+            <a:r>
+              <a:rPr lang="en-US" sz="2400" dirty="0" smtClean="0">
+                <a:latin typeface="Arial" panose="020B0604020202020204" pitchFamily="34" charset="0"/>
+                <a:cs typeface="Arial" panose="020B0604020202020204" pitchFamily="34" charset="0"/>
+              </a:rPr>
+              <a:t>Akhitha</a:t>
+            </a:r>
+            <a:r>
+              <a:rPr lang="en-US" dirty="0" smtClean="0">
+                <a:latin typeface="Arial" panose="020B0604020202020204" pitchFamily="34" charset="0"/>
+                <a:cs typeface="Arial" panose="020B0604020202020204" pitchFamily="34" charset="0"/>
+              </a:rPr>
+              <a:t> </a:t>
+            </a:r>
+            <a:r>
+              <a:rPr lang="en-US" sz="2400" dirty="0" smtClean="0">
+                <a:latin typeface="Arial" panose="020B0604020202020204" pitchFamily="34" charset="0"/>
+                <a:cs typeface="Arial" panose="020B0604020202020204" pitchFamily="34" charset="0"/>
+              </a:rPr>
+              <a:t>Tumula</a:t>
             </a:r>
             <a:endParaRPr lang="en-US" sz="2400" dirty="0">
               <a:latin typeface="Arial" panose="020B0604020202020204" pitchFamily="34" charset="0"/>
@@ -8518,14 +8618,7 @@
                 <a:latin typeface="Arial" panose="020B0604020202020204" pitchFamily="34" charset="0"/>
                 <a:cs typeface="Arial" panose="020B0604020202020204" pitchFamily="34" charset="0"/>
               </a:rPr>
-              <a:t>RethimaReddy </a:t>
-            </a:r>
-            <a:r>
-              <a:rPr lang="en-US" sz="1600" b="1" dirty="0" smtClean="0">
-                <a:latin typeface="Arial" panose="020B0604020202020204" pitchFamily="34" charset="0"/>
-                <a:cs typeface="Arial" panose="020B0604020202020204" pitchFamily="34" charset="0"/>
-              </a:rPr>
-              <a:t>Polam</a:t>
+              <a:t>RethimaReddy Polam</a:t>
             </a:r>
             <a:endParaRPr lang="en-US" sz="1600" b="1" dirty="0">
               <a:latin typeface="Arial" panose="020B0604020202020204" pitchFamily="34" charset="0"/>
@@ -8588,8 +8681,38 @@
         </p:blipFill>
         <p:spPr>
           <a:xfrm>
-            <a:off x="6723945" y="2953560"/>
-            <a:ext cx="1511960" cy="1931472"/>
+            <a:off x="6889045" y="2915460"/>
+            <a:ext cx="1531056" cy="1955866"/>
+          </a:xfrm>
+          <a:prstGeom prst="rect">
+            <a:avLst/>
+          </a:prstGeom>
+        </p:spPr>
+      </p:pic>
+      <p:pic>
+        <p:nvPicPr>
+          <p:cNvPr id="10" name="Picture 9"/>
+          <p:cNvPicPr>
+            <a:picLocks noChangeAspect="1"/>
+          </p:cNvPicPr>
+          <p:nvPr/>
+        </p:nvPicPr>
+        <p:blipFill>
+          <a:blip r:embed="rId4">
+            <a:extLst>
+              <a:ext uri="{28A0092B-C50C-407E-A947-70E740481C1C}">
+                <a14:useLocalDpi xmlns:a14="http://schemas.microsoft.com/office/drawing/2010/main" val="0"/>
+              </a:ext>
+            </a:extLst>
+          </a:blip>
+          <a:stretch>
+            <a:fillRect/>
+          </a:stretch>
+        </p:blipFill>
+        <p:spPr>
+          <a:xfrm>
+            <a:off x="1818330" y="2933700"/>
+            <a:ext cx="1556932" cy="1930400"/>
           </a:xfrm>
           <a:prstGeom prst="rect">
             <a:avLst/>
@@ -8658,21 +8781,7 @@
                 <a:latin typeface="Arial" panose="020B0604020202020204" pitchFamily="34" charset="0"/>
                 <a:cs typeface="Arial" panose="020B0604020202020204" pitchFamily="34" charset="0"/>
               </a:rPr>
-              <a:t>Agenda</a:t>
-            </a:r>
-            <a:r>
-              <a:rPr lang="en-US" b="1" dirty="0" smtClean="0">
-                <a:latin typeface="Arial" panose="020B0604020202020204" pitchFamily="34" charset="0"/>
-                <a:cs typeface="Arial" panose="020B0604020202020204" pitchFamily="34" charset="0"/>
-              </a:rPr>
-              <a:t> </a:t>
-            </a:r>
-            <a:r>
-              <a:rPr lang="en-US" b="1" dirty="0" smtClean="0">
-                <a:latin typeface="Arial" panose="020B0604020202020204" pitchFamily="34" charset="0"/>
-                <a:cs typeface="Arial" panose="020B0604020202020204" pitchFamily="34" charset="0"/>
-              </a:rPr>
-              <a:t>:</a:t>
+              <a:t>Agenda :</a:t>
             </a:r>
             <a:endParaRPr lang="en-US" b="1" dirty="0">
               <a:latin typeface="Arial" panose="020B0604020202020204" pitchFamily="34" charset="0"/>
@@ -8708,62 +8817,104 @@
               </a:rPr>
               <a:t>What is CSS Grid and CSS FlexBox</a:t>
             </a:r>
-            <a:endParaRPr lang="en-US" sz="2400" dirty="0" smtClean="0">
+          </a:p>
+          <a:p>
+            <a:r>
+              <a:rPr lang="en-US" sz="2400" dirty="0" smtClean="0">
+                <a:latin typeface="Arial" panose="020B0604020202020204" pitchFamily="34" charset="0"/>
+                <a:cs typeface="Arial" panose="020B0604020202020204" pitchFamily="34" charset="0"/>
+              </a:rPr>
+              <a:t>FlexBox</a:t>
+            </a:r>
+          </a:p>
+          <a:p>
+            <a:r>
+              <a:rPr lang="en-US" sz="2400" dirty="0" smtClean="0">
+                <a:latin typeface="Arial" panose="020B0604020202020204" pitchFamily="34" charset="0"/>
+                <a:cs typeface="Arial" panose="020B0604020202020204" pitchFamily="34" charset="0"/>
+              </a:rPr>
+              <a:t>FlexBox Properties</a:t>
+            </a:r>
+          </a:p>
+          <a:p>
+            <a:r>
+              <a:rPr lang="en-US" sz="2400" dirty="0" smtClean="0">
+                <a:latin typeface="Arial" panose="020B0604020202020204" pitchFamily="34" charset="0"/>
+                <a:cs typeface="Arial" panose="020B0604020202020204" pitchFamily="34" charset="0"/>
+              </a:rPr>
+              <a:t>Grid</a:t>
+            </a:r>
+          </a:p>
+          <a:p>
+            <a:r>
+              <a:rPr lang="en-US" sz="2400" dirty="0" smtClean="0">
+                <a:latin typeface="Arial" panose="020B0604020202020204" pitchFamily="34" charset="0"/>
+                <a:cs typeface="Arial" panose="020B0604020202020204" pitchFamily="34" charset="0"/>
+              </a:rPr>
+              <a:t>Grid Properties</a:t>
+            </a:r>
+          </a:p>
+          <a:p>
+            <a:r>
+              <a:rPr lang="en-US" sz="2400" dirty="0" smtClean="0">
+                <a:latin typeface="Arial" panose="020B0604020202020204" pitchFamily="34" charset="0"/>
+                <a:cs typeface="Arial" panose="020B0604020202020204" pitchFamily="34" charset="0"/>
+              </a:rPr>
+              <a:t>Demo</a:t>
+            </a:r>
+          </a:p>
+          <a:p>
+            <a:endParaRPr lang="en-US" dirty="0" smtClean="0">
               <a:latin typeface="Arial" panose="020B0604020202020204" pitchFamily="34" charset="0"/>
               <a:cs typeface="Arial" panose="020B0604020202020204" pitchFamily="34" charset="0"/>
             </a:endParaRPr>
           </a:p>
+        </p:txBody>
+      </p:sp>
+      <p:sp>
+        <p:nvSpPr>
+          <p:cNvPr id="4" name="TextBox 3"/>
+          <p:cNvSpPr txBox="1"/>
+          <p:nvPr/>
+        </p:nvSpPr>
+        <p:spPr>
+          <a:xfrm>
+            <a:off x="8191500" y="6286500"/>
+            <a:ext cx="4000500" cy="461665"/>
+          </a:xfrm>
+          <a:prstGeom prst="rect">
+            <a:avLst/>
+          </a:prstGeom>
+          <a:noFill/>
+        </p:spPr>
+        <p:txBody>
+          <a:bodyPr wrap="square" rtlCol="0">
+            <a:spAutoFit/>
+          </a:bodyPr>
+          <a:lstStyle/>
           <a:p>
             <a:r>
               <a:rPr lang="en-US" sz="2400" dirty="0" smtClean="0">
                 <a:latin typeface="Arial" panose="020B0604020202020204" pitchFamily="34" charset="0"/>
                 <a:cs typeface="Arial" panose="020B0604020202020204" pitchFamily="34" charset="0"/>
               </a:rPr>
-              <a:t>FlexBox</a:t>
-            </a:r>
-          </a:p>
-          <a:p>
+              <a:t>RethimaReddy </a:t>
+            </a:r>
+            <a:r>
+              <a:rPr lang="en-US" sz="2400" dirty="0">
+                <a:latin typeface="Arial" panose="020B0604020202020204" pitchFamily="34" charset="0"/>
+                <a:cs typeface="Arial" panose="020B0604020202020204" pitchFamily="34" charset="0"/>
+              </a:rPr>
+              <a:t>P</a:t>
+            </a:r>
             <a:r>
               <a:rPr lang="en-US" sz="2400" dirty="0" smtClean="0">
                 <a:latin typeface="Arial" panose="020B0604020202020204" pitchFamily="34" charset="0"/>
                 <a:cs typeface="Arial" panose="020B0604020202020204" pitchFamily="34" charset="0"/>
               </a:rPr>
-              <a:t>FlexBox Properties</a:t>
-            </a:r>
-          </a:p>
-          <a:p>
-            <a:r>
-              <a:rPr lang="en-US" sz="2400" dirty="0" smtClean="0">
-                <a:latin typeface="Arial" panose="020B0604020202020204" pitchFamily="34" charset="0"/>
-                <a:cs typeface="Arial" panose="020B0604020202020204" pitchFamily="34" charset="0"/>
-              </a:rPr>
-              <a:t>Grid</a:t>
-            </a:r>
-          </a:p>
-          <a:p>
-            <a:r>
-              <a:rPr lang="en-US" sz="2400" dirty="0" smtClean="0">
-                <a:latin typeface="Arial" panose="020B0604020202020204" pitchFamily="34" charset="0"/>
-                <a:cs typeface="Arial" panose="020B0604020202020204" pitchFamily="34" charset="0"/>
-              </a:rPr>
-              <a:t>Grid Properties</a:t>
-            </a:r>
-          </a:p>
-          <a:p>
-            <a:r>
-              <a:rPr lang="en-US" sz="2400" dirty="0" smtClean="0">
-                <a:latin typeface="Arial" panose="020B0604020202020204" pitchFamily="34" charset="0"/>
-                <a:cs typeface="Arial" panose="020B0604020202020204" pitchFamily="34" charset="0"/>
-              </a:rPr>
-              <a:t>Demo</a:t>
-            </a:r>
-            <a:endParaRPr lang="en-US" sz="2400" dirty="0" smtClean="0">
-              <a:latin typeface="Arial" panose="020B0604020202020204" pitchFamily="34" charset="0"/>
-              <a:cs typeface="Arial" panose="020B0604020202020204" pitchFamily="34" charset="0"/>
-            </a:endParaRPr>
-          </a:p>
-          <a:p>
-            <a:endParaRPr lang="en-US" dirty="0" smtClean="0">
+              <a:t>olam</a:t>
+            </a:r>
+            <a:endParaRPr lang="en-US" sz="2400" dirty="0">
               <a:latin typeface="Arial" panose="020B0604020202020204" pitchFamily="34" charset="0"/>
               <a:cs typeface="Arial" panose="020B0604020202020204" pitchFamily="34" charset="0"/>
             </a:endParaRPr>
@@ -8992,6 +9143,56 @@
           </a:p>
         </p:txBody>
       </p:sp>
+      <p:sp>
+        <p:nvSpPr>
+          <p:cNvPr id="4" name="TextBox 3"/>
+          <p:cNvSpPr txBox="1"/>
+          <p:nvPr/>
+        </p:nvSpPr>
+        <p:spPr>
+          <a:xfrm>
+            <a:off x="8191500" y="6286500"/>
+            <a:ext cx="4000500" cy="461665"/>
+          </a:xfrm>
+          <a:prstGeom prst="rect">
+            <a:avLst/>
+          </a:prstGeom>
+          <a:noFill/>
+        </p:spPr>
+        <p:txBody>
+          <a:bodyPr wrap="square" rtlCol="0">
+            <a:spAutoFit/>
+          </a:bodyPr>
+          <a:lstStyle/>
+          <a:p>
+            <a:r>
+              <a:rPr lang="en-US" sz="2400" dirty="0" smtClean="0">
+                <a:latin typeface="Arial" panose="020B0604020202020204" pitchFamily="34" charset="0"/>
+                <a:cs typeface="Arial" panose="020B0604020202020204" pitchFamily="34" charset="0"/>
+              </a:rPr>
+              <a:t>RethimaReddy </a:t>
+            </a:r>
+            <a:r>
+              <a:rPr lang="en-US" sz="2400" dirty="0">
+                <a:latin typeface="Arial" panose="020B0604020202020204" pitchFamily="34" charset="0"/>
+                <a:cs typeface="Arial" panose="020B0604020202020204" pitchFamily="34" charset="0"/>
+              </a:rPr>
+              <a:t>P</a:t>
+            </a:r>
+            <a:r>
+              <a:rPr lang="en-US" sz="2400" dirty="0" smtClean="0">
+                <a:latin typeface="Arial" panose="020B0604020202020204" pitchFamily="34" charset="0"/>
+                <a:cs typeface="Arial" panose="020B0604020202020204" pitchFamily="34" charset="0"/>
+              </a:rPr>
+              <a:t>olam</a:t>
+            </a:r>
+            <a:endParaRPr lang="en-US" sz="2400" dirty="0">
+              <a:latin typeface="Arial" panose="020B0604020202020204" pitchFamily="34" charset="0"/>
+              <a:cs typeface="Arial" panose="020B0604020202020204" pitchFamily="34" charset="0"/>
+            </a:endParaRPr>
+          </a:p>
+        </p:txBody>
+      </p:sp>
     </p:spTree>
     <p:extLst>
       <p:ext uri="{BB962C8B-B14F-4D97-AF65-F5344CB8AC3E}">
@@ -9194,7 +9395,53 @@
               </a:rPr>
               <a:t>11. align-self</a:t>
             </a:r>
-            <a:endParaRPr lang="en-US" sz="2000" dirty="0">
+          </a:p>
+        </p:txBody>
+      </p:sp>
+      <p:sp>
+        <p:nvSpPr>
+          <p:cNvPr id="4" name="TextBox 3"/>
+          <p:cNvSpPr txBox="1"/>
+          <p:nvPr/>
+        </p:nvSpPr>
+        <p:spPr>
+          <a:xfrm>
+            <a:off x="8191500" y="6286500"/>
+            <a:ext cx="4000500" cy="461665"/>
+          </a:xfrm>
+          <a:prstGeom prst="rect">
+            <a:avLst/>
+          </a:prstGeom>
+          <a:noFill/>
+        </p:spPr>
+        <p:txBody>
+          <a:bodyPr wrap="square" rtlCol="0">
+            <a:spAutoFit/>
+          </a:bodyPr>
+          <a:lstStyle/>
+          <a:p>
+            <a:r>
+              <a:rPr lang="en-US" sz="2400" dirty="0" smtClean="0">
+                <a:latin typeface="Arial" panose="020B0604020202020204" pitchFamily="34" charset="0"/>
+                <a:cs typeface="Arial" panose="020B0604020202020204" pitchFamily="34" charset="0"/>
+              </a:rPr>
+              <a:t>RethimaReddy </a:t>
+            </a:r>
+            <a:r>
+              <a:rPr lang="en-US" sz="2400" dirty="0">
+                <a:latin typeface="Arial" panose="020B0604020202020204" pitchFamily="34" charset="0"/>
+                <a:cs typeface="Arial" panose="020B0604020202020204" pitchFamily="34" charset="0"/>
+              </a:rPr>
+              <a:t>P</a:t>
+            </a:r>
+            <a:r>
+              <a:rPr lang="en-US" sz="2400" dirty="0" smtClean="0">
+                <a:latin typeface="Arial" panose="020B0604020202020204" pitchFamily="34" charset="0"/>
+                <a:cs typeface="Arial" panose="020B0604020202020204" pitchFamily="34" charset="0"/>
+              </a:rPr>
+              <a:t>olam</a:t>
+            </a:r>
+            <a:endParaRPr lang="en-US" sz="2400" dirty="0">
               <a:latin typeface="Arial" panose="020B0604020202020204" pitchFamily="34" charset="0"/>
               <a:cs typeface="Arial" panose="020B0604020202020204" pitchFamily="34" charset="0"/>
             </a:endParaRPr>
@@ -9250,7 +9497,7 @@
         </p:nvSpPr>
         <p:spPr>
           <a:xfrm>
-            <a:off x="1641454" y="380228"/>
+            <a:off x="1539854" y="0"/>
             <a:ext cx="8911687" cy="737629"/>
           </a:xfrm>
         </p:spPr>
@@ -9324,7 +9571,7 @@
         </p:blipFill>
         <p:spPr>
           <a:xfrm>
-            <a:off x="1641454" y="1302523"/>
+            <a:off x="1616054" y="1023123"/>
             <a:ext cx="4759345" cy="2413941"/>
           </a:xfrm>
         </p:spPr>
@@ -9351,8 +9598,8 @@
         </p:blipFill>
         <p:spPr>
           <a:xfrm>
-            <a:off x="6894284" y="1214951"/>
-            <a:ext cx="4717143" cy="2501513"/>
+            <a:off x="6972300" y="1015793"/>
+            <a:ext cx="4613727" cy="2446671"/>
           </a:xfrm>
           <a:prstGeom prst="rect">
             <a:avLst/>
@@ -9367,7 +9614,7 @@
         </p:nvSpPr>
         <p:spPr>
           <a:xfrm>
-            <a:off x="1641455" y="845619"/>
+            <a:off x="1704955" y="464619"/>
             <a:ext cx="7255410" cy="369332"/>
           </a:xfrm>
           <a:prstGeom prst="rect">
@@ -9397,7 +9644,7 @@
         </p:nvSpPr>
         <p:spPr>
           <a:xfrm>
-            <a:off x="1555623" y="3869420"/>
+            <a:off x="1568323" y="3513820"/>
             <a:ext cx="10055803" cy="369332"/>
           </a:xfrm>
           <a:prstGeom prst="rect">
@@ -9441,7 +9688,7 @@
         </p:blipFill>
         <p:spPr>
           <a:xfrm>
-            <a:off x="1555624" y="4238752"/>
+            <a:off x="1555624" y="3972052"/>
             <a:ext cx="4845175" cy="2470953"/>
           </a:xfrm>
           <a:prstGeom prst="rect">
@@ -9471,7 +9718,7 @@
         </p:blipFill>
         <p:spPr>
           <a:xfrm>
-            <a:off x="6894285" y="4243937"/>
+            <a:off x="6945085" y="3951837"/>
             <a:ext cx="4717143" cy="2464618"/>
           </a:xfrm>
           <a:prstGeom prst="rect">
@@ -9479,6 +9726,42 @@
           </a:prstGeom>
         </p:spPr>
       </p:pic>
+      <p:sp>
+        <p:nvSpPr>
+          <p:cNvPr id="3" name="TextBox 2"/>
+          <p:cNvSpPr txBox="1"/>
+          <p:nvPr/>
+        </p:nvSpPr>
+        <p:spPr>
+          <a:xfrm>
+            <a:off x="7556500" y="6396335"/>
+            <a:ext cx="4635500" cy="461665"/>
+          </a:xfrm>
+          <a:prstGeom prst="rect">
+            <a:avLst/>
+          </a:prstGeom>
+          <a:noFill/>
+        </p:spPr>
+        <p:txBody>
+          <a:bodyPr wrap="square" rtlCol="0">
+            <a:spAutoFit/>
+          </a:bodyPr>
+          <a:lstStyle/>
+          <a:p>
+            <a:r>
+              <a:rPr lang="en-US" sz="2400" dirty="0" smtClean="0">
+                <a:latin typeface="Arial" panose="020B0604020202020204" pitchFamily="34" charset="0"/>
+                <a:cs typeface="Arial" panose="020B0604020202020204" pitchFamily="34" charset="0"/>
+              </a:rPr>
+              <a:t>Mahender Reddy Surkanti</a:t>
+            </a:r>
+            <a:endParaRPr lang="en-US" sz="2400" dirty="0">
+              <a:latin typeface="Arial" panose="020B0604020202020204" pitchFamily="34" charset="0"/>
+              <a:cs typeface="Arial" panose="020B0604020202020204" pitchFamily="34" charset="0"/>
+            </a:endParaRPr>
+          </a:p>
+        </p:txBody>
+      </p:sp>
     </p:spTree>
     <p:extLst>
       <p:ext uri="{BB962C8B-B14F-4D97-AF65-F5344CB8AC3E}">
@@ -9645,7 +9928,16 @@
             </a:endParaRPr>
           </a:p>
           <a:p>
-            <a:pPr marL="0" indent="0">
+            <a:pPr marL="3657600" lvl="8" indent="0">
+              <a:buNone/>
+            </a:pPr>
+            <a:endParaRPr lang="en-US" sz="2400" dirty="0">
+              <a:latin typeface="Arial" panose="020B0604020202020204" pitchFamily="34" charset="0"/>
+              <a:cs typeface="Arial" panose="020B0604020202020204" pitchFamily="34" charset="0"/>
+            </a:endParaRPr>
+          </a:p>
+          <a:p>
+            <a:pPr marL="3657600" lvl="8" indent="0">
               <a:buNone/>
             </a:pPr>
             <a:endParaRPr lang="en-US" sz="2400" dirty="0" smtClean="0">
@@ -9654,22 +9946,15 @@
             </a:endParaRPr>
           </a:p>
           <a:p>
-            <a:pPr marL="0" indent="0">
+            <a:pPr marL="3657600" lvl="8" indent="0">
               <a:buNone/>
             </a:pPr>
-            <a:endParaRPr lang="en-US" sz="2400" dirty="0" smtClean="0">
-              <a:latin typeface="Arial" panose="020B0604020202020204" pitchFamily="34" charset="0"/>
-              <a:cs typeface="Arial" panose="020B0604020202020204" pitchFamily="34" charset="0"/>
-            </a:endParaRPr>
-          </a:p>
-          <a:p>
-            <a:pPr lvl="8"/>
             <a:r>
               <a:rPr lang="en-US" sz="1800" dirty="0" smtClean="0">
                 <a:latin typeface="Arial" panose="020B0604020202020204" pitchFamily="34" charset="0"/>
                 <a:cs typeface="Arial" panose="020B0604020202020204" pitchFamily="34" charset="0"/>
               </a:rPr>
-              <a:t>wrap-reverse									</a:t>
+              <a:t>								</a:t>
             </a:r>
             <a:endParaRPr lang="en-US" sz="1800" dirty="0">
               <a:latin typeface="Arial" panose="020B0604020202020204" pitchFamily="34" charset="0"/>
@@ -9760,14 +10045,90 @@
         </p:blipFill>
         <p:spPr>
           <a:xfrm>
-            <a:off x="3715656" y="4731657"/>
-            <a:ext cx="4557485" cy="2017486"/>
+            <a:off x="947056" y="4711700"/>
+            <a:ext cx="5148944" cy="2146300"/>
           </a:xfrm>
           <a:prstGeom prst="rect">
             <a:avLst/>
           </a:prstGeom>
         </p:spPr>
       </p:pic>
+      <p:sp>
+        <p:nvSpPr>
+          <p:cNvPr id="8" name="TextBox 7"/>
+          <p:cNvSpPr txBox="1"/>
+          <p:nvPr/>
+        </p:nvSpPr>
+        <p:spPr>
+          <a:xfrm>
+            <a:off x="2197100" y="4279901"/>
+            <a:ext cx="2349500" cy="457200"/>
+          </a:xfrm>
+          <a:prstGeom prst="rect">
+            <a:avLst/>
+          </a:prstGeom>
+          <a:noFill/>
+        </p:spPr>
+        <p:txBody>
+          <a:bodyPr wrap="square" rtlCol="0">
+            <a:spAutoFit/>
+          </a:bodyPr>
+          <a:lstStyle/>
+          <a:p>
+            <a:r>
+              <a:rPr lang="en-US" sz="2400" dirty="0">
+                <a:latin typeface="Arial" panose="020B0604020202020204" pitchFamily="34" charset="0"/>
+                <a:cs typeface="Arial" panose="020B0604020202020204" pitchFamily="34" charset="0"/>
+              </a:rPr>
+              <a:t>wrap-reverse</a:t>
+            </a:r>
+            <a:r>
+              <a:rPr lang="en-US" dirty="0">
+                <a:latin typeface="Arial" panose="020B0604020202020204" pitchFamily="34" charset="0"/>
+                <a:cs typeface="Arial" panose="020B0604020202020204" pitchFamily="34" charset="0"/>
+              </a:rPr>
+              <a:t>	</a:t>
+            </a:r>
+            <a:endParaRPr lang="en-US" dirty="0"/>
+          </a:p>
+        </p:txBody>
+      </p:sp>
+      <p:sp>
+        <p:nvSpPr>
+          <p:cNvPr id="9" name="TextBox 8"/>
+          <p:cNvSpPr txBox="1"/>
+          <p:nvPr/>
+        </p:nvSpPr>
+        <p:spPr>
+          <a:xfrm>
+            <a:off x="8153400" y="6396335"/>
+            <a:ext cx="4445000" cy="461665"/>
+          </a:xfrm>
+          <a:prstGeom prst="rect">
+            <a:avLst/>
+          </a:prstGeom>
+          <a:noFill/>
+        </p:spPr>
+        <p:txBody>
+          <a:bodyPr wrap="square" rtlCol="0">
+            <a:spAutoFit/>
+          </a:bodyPr>
+          <a:lstStyle/>
+          <a:p>
+            <a:r>
+              <a:rPr lang="en-US" sz="2400" dirty="0" smtClean="0">
+                <a:latin typeface="Arial" panose="020B0604020202020204" pitchFamily="34" charset="0"/>
+                <a:cs typeface="Arial" panose="020B0604020202020204" pitchFamily="34" charset="0"/>
+              </a:rPr>
+              <a:t>Mahender Reddy Surkanti</a:t>
+            </a:r>
+            <a:endParaRPr lang="en-US" sz="2400" dirty="0">
+              <a:latin typeface="Arial" panose="020B0604020202020204" pitchFamily="34" charset="0"/>
+              <a:cs typeface="Arial" panose="020B0604020202020204" pitchFamily="34" charset="0"/>
+            </a:endParaRPr>
+          </a:p>
+        </p:txBody>
+      </p:sp>
     </p:spTree>
     <p:extLst>
       <p:ext uri="{BB962C8B-B14F-4D97-AF65-F5344CB8AC3E}">
@@ -10001,7 +10362,7 @@
         </p:blipFill>
         <p:spPr>
           <a:xfrm>
-            <a:off x="595086" y="3552370"/>
+            <a:off x="583974" y="3580945"/>
             <a:ext cx="4920343" cy="2747108"/>
           </a:xfrm>
           <a:prstGeom prst="rect">
@@ -10039,6 +10400,42 @@
           </a:prstGeom>
         </p:spPr>
       </p:pic>
+      <p:sp>
+        <p:nvSpPr>
+          <p:cNvPr id="8" name="TextBox 7"/>
+          <p:cNvSpPr txBox="1"/>
+          <p:nvPr/>
+        </p:nvSpPr>
+        <p:spPr>
+          <a:xfrm>
+            <a:off x="8191500" y="6375400"/>
+            <a:ext cx="4000500" cy="461665"/>
+          </a:xfrm>
+          <a:prstGeom prst="rect">
+            <a:avLst/>
+          </a:prstGeom>
+          <a:noFill/>
+        </p:spPr>
+        <p:txBody>
+          <a:bodyPr wrap="square" rtlCol="0">
+            <a:spAutoFit/>
+          </a:bodyPr>
+          <a:lstStyle/>
+          <a:p>
+            <a:r>
+              <a:rPr lang="en-US" sz="2400" dirty="0" smtClean="0">
+                <a:latin typeface="Arial" panose="020B0604020202020204" pitchFamily="34" charset="0"/>
+                <a:cs typeface="Arial" panose="020B0604020202020204" pitchFamily="34" charset="0"/>
+              </a:rPr>
+              <a:t>Mahender Reddy Surkanti</a:t>
+            </a:r>
+            <a:endParaRPr lang="en-US" sz="2400" dirty="0">
+              <a:latin typeface="Arial" panose="020B0604020202020204" pitchFamily="34" charset="0"/>
+              <a:cs typeface="Arial" panose="020B0604020202020204" pitchFamily="34" charset="0"/>
+            </a:endParaRPr>
+          </a:p>
+        </p:txBody>
+      </p:sp>
     </p:spTree>
     <p:extLst>
       <p:ext uri="{BB962C8B-B14F-4D97-AF65-F5344CB8AC3E}">
@@ -10234,6 +10631,42 @@
             </a:endParaRPr>
           </a:p>
           <a:p>
+            <a:endParaRPr lang="en-US" sz="2400" dirty="0">
+              <a:latin typeface="Arial" panose="020B0604020202020204" pitchFamily="34" charset="0"/>
+              <a:cs typeface="Arial" panose="020B0604020202020204" pitchFamily="34" charset="0"/>
+            </a:endParaRPr>
+          </a:p>
+        </p:txBody>
+      </p:sp>
+      <p:sp>
+        <p:nvSpPr>
+          <p:cNvPr id="2" name="TextBox 1"/>
+          <p:cNvSpPr txBox="1"/>
+          <p:nvPr/>
+        </p:nvSpPr>
+        <p:spPr>
+          <a:xfrm>
+            <a:off x="8267700" y="6396335"/>
+            <a:ext cx="3924300" cy="461665"/>
+          </a:xfrm>
+          <a:prstGeom prst="rect">
+            <a:avLst/>
+          </a:prstGeom>
+          <a:noFill/>
+        </p:spPr>
+        <p:txBody>
+          <a:bodyPr wrap="square" rtlCol="0">
+            <a:spAutoFit/>
+          </a:bodyPr>
+          <a:lstStyle/>
+          <a:p>
+            <a:r>
+              <a:rPr lang="en-US" sz="2400" dirty="0" smtClean="0">
+                <a:latin typeface="Arial" panose="020B0604020202020204" pitchFamily="34" charset="0"/>
+                <a:cs typeface="Arial" panose="020B0604020202020204" pitchFamily="34" charset="0"/>
+              </a:rPr>
+              <a:t>Mahender Reddy Surkanti</a:t>
+            </a:r>
             <a:endParaRPr lang="en-US" sz="2400" dirty="0">
               <a:latin typeface="Arial" panose="020B0604020202020204" pitchFamily="34" charset="0"/>
               <a:cs typeface="Arial" panose="020B0604020202020204" pitchFamily="34" charset="0"/>

</xml_diff>